<commit_message>
low back risk done
Signed-off-by: Albert <wensinlor@gmail.com>
</commit_message>
<xml_diff>
--- a/Meeting_Materials/Ergonomics Sembreak Week 1.pptx
+++ b/Meeting_Materials/Ergonomics Sembreak Week 1.pptx
@@ -147,6 +147,30 @@
 <file path=ppt/changesInfos/changesInfo1.xml><?xml version="1.0" encoding="utf-8"?>
 <pc:chgInfo xmlns:a="http://schemas.openxmlformats.org/drawingml/2006/main" xmlns:r="http://schemas.openxmlformats.org/officeDocument/2006/relationships" xmlns:ac="http://schemas.microsoft.com/office/drawing/2013/main/command" xmlns:pc="http://schemas.microsoft.com/office/powerpoint/2013/main/command">
   <pc:docChgLst>
+    <pc:chgData name="#LOR WEN SIN#" userId="S::wlor001@e.ntu.edu.sg::f0d13d38-c6da-4a13-bbd5-986d82422d78" providerId="AD" clId="Web-{7034C2DA-571A-6E61-4BB9-541BD4F58A16}"/>
+    <pc:docChg chg="modSld">
+      <pc:chgData name="#LOR WEN SIN#" userId="S::wlor001@e.ntu.edu.sg::f0d13d38-c6da-4a13-bbd5-986d82422d78" providerId="AD" clId="Web-{7034C2DA-571A-6E61-4BB9-541BD4F58A16}" dt="2022-12-06T17:06:49.927" v="1" actId="1076"/>
+      <pc:docMkLst>
+        <pc:docMk/>
+      </pc:docMkLst>
+      <pc:sldChg chg="modSp">
+        <pc:chgData name="#LOR WEN SIN#" userId="S::wlor001@e.ntu.edu.sg::f0d13d38-c6da-4a13-bbd5-986d82422d78" providerId="AD" clId="Web-{7034C2DA-571A-6E61-4BB9-541BD4F58A16}" dt="2022-12-06T17:06:49.927" v="1" actId="1076"/>
+        <pc:sldMkLst>
+          <pc:docMk/>
+          <pc:sldMk cId="3343953512" sldId="260"/>
+        </pc:sldMkLst>
+        <pc:spChg chg="mod">
+          <ac:chgData name="#LOR WEN SIN#" userId="S::wlor001@e.ntu.edu.sg::f0d13d38-c6da-4a13-bbd5-986d82422d78" providerId="AD" clId="Web-{7034C2DA-571A-6E61-4BB9-541BD4F58A16}" dt="2022-12-06T17:06:49.927" v="1" actId="1076"/>
+          <ac:spMkLst>
+            <pc:docMk/>
+            <pc:sldMk cId="3343953512" sldId="260"/>
+            <ac:spMk id="2" creationId="{7A52E233-DA80-5A3A-534F-8A98B545F1D9}"/>
+          </ac:spMkLst>
+        </pc:spChg>
+      </pc:sldChg>
+    </pc:docChg>
+  </pc:docChgLst>
+  <pc:docChgLst>
     <pc:chgData name="WLOR001@e.ntu.edu.sg" userId="f0d13d38-c6da-4a13-bbd5-986d82422d78" providerId="ADAL" clId="{3D8A7C46-7ADD-4EC1-9C73-A67BF3B1AE74}"/>
     <pc:docChg chg="undo redo custSel addSld delSld modSld sldOrd">
       <pc:chgData name="WLOR001@e.ntu.edu.sg" userId="f0d13d38-c6da-4a13-bbd5-986d82422d78" providerId="ADAL" clId="{3D8A7C46-7ADD-4EC1-9C73-A67BF3B1AE74}" dt="2022-12-01T18:39:30.436" v="3958" actId="1076"/>
@@ -2891,30 +2915,6 @@
     </pc:docChg>
   </pc:docChgLst>
   <pc:docChgLst>
-    <pc:chgData name="#LOR WEN SIN#" userId="S::wlor001@e.ntu.edu.sg::f0d13d38-c6da-4a13-bbd5-986d82422d78" providerId="AD" clId="Web-{7034C2DA-571A-6E61-4BB9-541BD4F58A16}"/>
-    <pc:docChg chg="modSld">
-      <pc:chgData name="#LOR WEN SIN#" userId="S::wlor001@e.ntu.edu.sg::f0d13d38-c6da-4a13-bbd5-986d82422d78" providerId="AD" clId="Web-{7034C2DA-571A-6E61-4BB9-541BD4F58A16}" dt="2022-12-06T17:06:49.927" v="1" actId="1076"/>
-      <pc:docMkLst>
-        <pc:docMk/>
-      </pc:docMkLst>
-      <pc:sldChg chg="modSp">
-        <pc:chgData name="#LOR WEN SIN#" userId="S::wlor001@e.ntu.edu.sg::f0d13d38-c6da-4a13-bbd5-986d82422d78" providerId="AD" clId="Web-{7034C2DA-571A-6E61-4BB9-541BD4F58A16}" dt="2022-12-06T17:06:49.927" v="1" actId="1076"/>
-        <pc:sldMkLst>
-          <pc:docMk/>
-          <pc:sldMk cId="3343953512" sldId="260"/>
-        </pc:sldMkLst>
-        <pc:spChg chg="mod">
-          <ac:chgData name="#LOR WEN SIN#" userId="S::wlor001@e.ntu.edu.sg::f0d13d38-c6da-4a13-bbd5-986d82422d78" providerId="AD" clId="Web-{7034C2DA-571A-6E61-4BB9-541BD4F58A16}" dt="2022-12-06T17:06:49.927" v="1" actId="1076"/>
-          <ac:spMkLst>
-            <pc:docMk/>
-            <pc:sldMk cId="3343953512" sldId="260"/>
-            <ac:spMk id="2" creationId="{7A52E233-DA80-5A3A-534F-8A98B545F1D9}"/>
-          </ac:spMkLst>
-        </pc:spChg>
-      </pc:sldChg>
-    </pc:docChg>
-  </pc:docChgLst>
-  <pc:docChgLst>
     <pc:chgData name="#LOR WEN SIN#" userId="S::wlor001@e.ntu.edu.sg::f0d13d38-c6da-4a13-bbd5-986d82422d78" providerId="AD" clId="Web-{C5E24799-00BC-68AC-A896-11239FF7D179}"/>
     <pc:docChg chg="modSld">
       <pc:chgData name="#LOR WEN SIN#" userId="S::wlor001@e.ntu.edu.sg::f0d13d38-c6da-4a13-bbd5-986d82422d78" providerId="AD" clId="Web-{C5E24799-00BC-68AC-A896-11239FF7D179}" dt="2022-11-30T04:35:05.166" v="0" actId="20577"/>
@@ -2935,825 +2935,6 @@
             <ac:spMk id="2" creationId="{24819CFA-06A7-F042-47D1-18EFB2ACB2CA}"/>
           </ac:spMkLst>
         </pc:spChg>
-      </pc:sldChg>
-    </pc:docChg>
-  </pc:docChgLst>
-  <pc:docChgLst>
-    <pc:chgData name="#LOR WEN SIN#" userId="f0d13d38-c6da-4a13-bbd5-986d82422d78" providerId="ADAL" clId="{3D8A7C46-7ADD-4EC1-9C73-A67BF3B1AE74}"/>
-    <pc:docChg chg="undo custSel addSld modSld sldOrd">
-      <pc:chgData name="#LOR WEN SIN#" userId="f0d13d38-c6da-4a13-bbd5-986d82422d78" providerId="ADAL" clId="{3D8A7C46-7ADD-4EC1-9C73-A67BF3B1AE74}" dt="2022-12-12T07:37:47.071" v="935" actId="14100"/>
-      <pc:docMkLst>
-        <pc:docMk/>
-      </pc:docMkLst>
-      <pc:sldChg chg="modSp">
-        <pc:chgData name="#LOR WEN SIN#" userId="f0d13d38-c6da-4a13-bbd5-986d82422d78" providerId="ADAL" clId="{3D8A7C46-7ADD-4EC1-9C73-A67BF3B1AE74}" dt="2022-12-06T16:38:02.705" v="934" actId="20577"/>
-        <pc:sldMkLst>
-          <pc:docMk/>
-          <pc:sldMk cId="282300819" sldId="257"/>
-        </pc:sldMkLst>
-        <pc:spChg chg="mod">
-          <ac:chgData name="#LOR WEN SIN#" userId="f0d13d38-c6da-4a13-bbd5-986d82422d78" providerId="ADAL" clId="{3D8A7C46-7ADD-4EC1-9C73-A67BF3B1AE74}" dt="2022-12-06T16:38:02.705" v="934" actId="20577"/>
-          <ac:spMkLst>
-            <pc:docMk/>
-            <pc:sldMk cId="282300819" sldId="257"/>
-            <ac:spMk id="2" creationId="{24819CFA-06A7-F042-47D1-18EFB2ACB2CA}"/>
-          </ac:spMkLst>
-        </pc:spChg>
-      </pc:sldChg>
-      <pc:sldChg chg="modSp mod">
-        <pc:chgData name="#LOR WEN SIN#" userId="f0d13d38-c6da-4a13-bbd5-986d82422d78" providerId="ADAL" clId="{3D8A7C46-7ADD-4EC1-9C73-A67BF3B1AE74}" dt="2022-12-12T07:37:47.071" v="935" actId="14100"/>
-        <pc:sldMkLst>
-          <pc:docMk/>
-          <pc:sldMk cId="562134134" sldId="261"/>
-        </pc:sldMkLst>
-        <pc:cxnChg chg="mod">
-          <ac:chgData name="#LOR WEN SIN#" userId="f0d13d38-c6da-4a13-bbd5-986d82422d78" providerId="ADAL" clId="{3D8A7C46-7ADD-4EC1-9C73-A67BF3B1AE74}" dt="2022-12-12T07:37:47.071" v="935" actId="14100"/>
-          <ac:cxnSpMkLst>
-            <pc:docMk/>
-            <pc:sldMk cId="562134134" sldId="261"/>
-            <ac:cxnSpMk id="33" creationId="{9A8BD10C-F05E-0492-8F4C-8160B58A9A0C}"/>
-          </ac:cxnSpMkLst>
-        </pc:cxnChg>
-      </pc:sldChg>
-      <pc:sldChg chg="modSp mod">
-        <pc:chgData name="#LOR WEN SIN#" userId="f0d13d38-c6da-4a13-bbd5-986d82422d78" providerId="ADAL" clId="{3D8A7C46-7ADD-4EC1-9C73-A67BF3B1AE74}" dt="2022-12-02T03:34:35.381" v="906" actId="20577"/>
-        <pc:sldMkLst>
-          <pc:docMk/>
-          <pc:sldMk cId="2699799663" sldId="269"/>
-        </pc:sldMkLst>
-        <pc:spChg chg="mod">
-          <ac:chgData name="#LOR WEN SIN#" userId="f0d13d38-c6da-4a13-bbd5-986d82422d78" providerId="ADAL" clId="{3D8A7C46-7ADD-4EC1-9C73-A67BF3B1AE74}" dt="2022-12-02T03:34:35.381" v="906" actId="20577"/>
-          <ac:spMkLst>
-            <pc:docMk/>
-            <pc:sldMk cId="2699799663" sldId="269"/>
-            <ac:spMk id="6" creationId="{5CD50B1F-CE0D-FED6-70A2-576A7E6C8A86}"/>
-          </ac:spMkLst>
-        </pc:spChg>
-      </pc:sldChg>
-      <pc:sldChg chg="addSp delSp modSp mod">
-        <pc:chgData name="#LOR WEN SIN#" userId="f0d13d38-c6da-4a13-bbd5-986d82422d78" providerId="ADAL" clId="{3D8A7C46-7ADD-4EC1-9C73-A67BF3B1AE74}" dt="2022-12-01T18:41:27.233" v="8" actId="21"/>
-        <pc:sldMkLst>
-          <pc:docMk/>
-          <pc:sldMk cId="2845790074" sldId="273"/>
-        </pc:sldMkLst>
-        <pc:spChg chg="add del mod">
-          <ac:chgData name="#LOR WEN SIN#" userId="f0d13d38-c6da-4a13-bbd5-986d82422d78" providerId="ADAL" clId="{3D8A7C46-7ADD-4EC1-9C73-A67BF3B1AE74}" dt="2022-12-01T18:41:27.233" v="8" actId="21"/>
-          <ac:spMkLst>
-            <pc:docMk/>
-            <pc:sldMk cId="2845790074" sldId="273"/>
-            <ac:spMk id="5" creationId="{F2D2999C-647C-F479-5E91-2FE27298B98B}"/>
-          </ac:spMkLst>
-        </pc:spChg>
-        <pc:picChg chg="del mod">
-          <ac:chgData name="#LOR WEN SIN#" userId="f0d13d38-c6da-4a13-bbd5-986d82422d78" providerId="ADAL" clId="{3D8A7C46-7ADD-4EC1-9C73-A67BF3B1AE74}" dt="2022-12-01T18:41:02.798" v="3" actId="478"/>
-          <ac:picMkLst>
-            <pc:docMk/>
-            <pc:sldMk cId="2845790074" sldId="273"/>
-            <ac:picMk id="41" creationId="{D4809756-D938-E287-68E7-52A4F7FF5B68}"/>
-          </ac:picMkLst>
-        </pc:picChg>
-      </pc:sldChg>
-      <pc:sldChg chg="addSp delSp modSp add mod">
-        <pc:chgData name="#LOR WEN SIN#" userId="f0d13d38-c6da-4a13-bbd5-986d82422d78" providerId="ADAL" clId="{3D8A7C46-7ADD-4EC1-9C73-A67BF3B1AE74}" dt="2022-12-01T18:47:24.274" v="223" actId="478"/>
-        <pc:sldMkLst>
-          <pc:docMk/>
-          <pc:sldMk cId="2733225216" sldId="274"/>
-        </pc:sldMkLst>
-        <pc:spChg chg="add mod">
-          <ac:chgData name="#LOR WEN SIN#" userId="f0d13d38-c6da-4a13-bbd5-986d82422d78" providerId="ADAL" clId="{3D8A7C46-7ADD-4EC1-9C73-A67BF3B1AE74}" dt="2022-12-01T18:41:29.049" v="9"/>
-          <ac:spMkLst>
-            <pc:docMk/>
-            <pc:sldMk cId="2733225216" sldId="274"/>
-            <ac:spMk id="5" creationId="{02F7AD3E-565F-2A15-8B40-B551C6FC47DE}"/>
-          </ac:spMkLst>
-        </pc:spChg>
-        <pc:picChg chg="del">
-          <ac:chgData name="#LOR WEN SIN#" userId="f0d13d38-c6da-4a13-bbd5-986d82422d78" providerId="ADAL" clId="{3D8A7C46-7ADD-4EC1-9C73-A67BF3B1AE74}" dt="2022-12-01T18:47:24.274" v="223" actId="478"/>
-          <ac:picMkLst>
-            <pc:docMk/>
-            <pc:sldMk cId="2733225216" sldId="274"/>
-            <ac:picMk id="41" creationId="{D4809756-D938-E287-68E7-52A4F7FF5B68}"/>
-          </ac:picMkLst>
-        </pc:picChg>
-      </pc:sldChg>
-      <pc:sldChg chg="addSp modSp add mod ord">
-        <pc:chgData name="#LOR WEN SIN#" userId="f0d13d38-c6da-4a13-bbd5-986d82422d78" providerId="ADAL" clId="{3D8A7C46-7ADD-4EC1-9C73-A67BF3B1AE74}" dt="2022-12-01T18:47:42.085" v="225" actId="1076"/>
-        <pc:sldMkLst>
-          <pc:docMk/>
-          <pc:sldMk cId="3490473200" sldId="275"/>
-        </pc:sldMkLst>
-        <pc:spChg chg="add mod">
-          <ac:chgData name="#LOR WEN SIN#" userId="f0d13d38-c6da-4a13-bbd5-986d82422d78" providerId="ADAL" clId="{3D8A7C46-7ADD-4EC1-9C73-A67BF3B1AE74}" dt="2022-12-01T18:47:42.085" v="225" actId="1076"/>
-          <ac:spMkLst>
-            <pc:docMk/>
-            <pc:sldMk cId="3490473200" sldId="275"/>
-            <ac:spMk id="5" creationId="{835114DF-08F6-34B8-CB4B-48FB882CDB9E}"/>
-          </ac:spMkLst>
-        </pc:spChg>
-      </pc:sldChg>
-      <pc:sldChg chg="addSp delSp modSp add mod">
-        <pc:chgData name="#LOR WEN SIN#" userId="f0d13d38-c6da-4a13-bbd5-986d82422d78" providerId="ADAL" clId="{3D8A7C46-7ADD-4EC1-9C73-A67BF3B1AE74}" dt="2022-12-01T18:46:06.405" v="138" actId="1076"/>
-        <pc:sldMkLst>
-          <pc:docMk/>
-          <pc:sldMk cId="2904309918" sldId="276"/>
-        </pc:sldMkLst>
-        <pc:spChg chg="del">
-          <ac:chgData name="#LOR WEN SIN#" userId="f0d13d38-c6da-4a13-bbd5-986d82422d78" providerId="ADAL" clId="{3D8A7C46-7ADD-4EC1-9C73-A67BF3B1AE74}" dt="2022-12-01T18:42:42.986" v="20" actId="478"/>
-          <ac:spMkLst>
-            <pc:docMk/>
-            <pc:sldMk cId="2904309918" sldId="276"/>
-            <ac:spMk id="3" creationId="{58241D10-3CEB-9D8A-00D7-3ACBECE79EAC}"/>
-          </ac:spMkLst>
-        </pc:spChg>
-        <pc:spChg chg="del">
-          <ac:chgData name="#LOR WEN SIN#" userId="f0d13d38-c6da-4a13-bbd5-986d82422d78" providerId="ADAL" clId="{3D8A7C46-7ADD-4EC1-9C73-A67BF3B1AE74}" dt="2022-12-01T18:42:37.258" v="18" actId="478"/>
-          <ac:spMkLst>
-            <pc:docMk/>
-            <pc:sldMk cId="2904309918" sldId="276"/>
-            <ac:spMk id="4" creationId="{959FAC9C-7D46-1EE4-BEBF-74D56D07856C}"/>
-          </ac:spMkLst>
-        </pc:spChg>
-        <pc:spChg chg="del">
-          <ac:chgData name="#LOR WEN SIN#" userId="f0d13d38-c6da-4a13-bbd5-986d82422d78" providerId="ADAL" clId="{3D8A7C46-7ADD-4EC1-9C73-A67BF3B1AE74}" dt="2022-12-01T18:41:59.657" v="14" actId="478"/>
-          <ac:spMkLst>
-            <pc:docMk/>
-            <pc:sldMk cId="2904309918" sldId="276"/>
-            <ac:spMk id="5" creationId="{02F7AD3E-565F-2A15-8B40-B551C6FC47DE}"/>
-          </ac:spMkLst>
-        </pc:spChg>
-        <pc:spChg chg="del">
-          <ac:chgData name="#LOR WEN SIN#" userId="f0d13d38-c6da-4a13-bbd5-986d82422d78" providerId="ADAL" clId="{3D8A7C46-7ADD-4EC1-9C73-A67BF3B1AE74}" dt="2022-12-01T18:42:42.986" v="20" actId="478"/>
-          <ac:spMkLst>
-            <pc:docMk/>
-            <pc:sldMk cId="2904309918" sldId="276"/>
-            <ac:spMk id="6" creationId="{54B11454-208D-E89A-0CD3-181FFB8D497A}"/>
-          </ac:spMkLst>
-        </pc:spChg>
-        <pc:spChg chg="del">
-          <ac:chgData name="#LOR WEN SIN#" userId="f0d13d38-c6da-4a13-bbd5-986d82422d78" providerId="ADAL" clId="{3D8A7C46-7ADD-4EC1-9C73-A67BF3B1AE74}" dt="2022-12-01T18:42:42.986" v="20" actId="478"/>
-          <ac:spMkLst>
-            <pc:docMk/>
-            <pc:sldMk cId="2904309918" sldId="276"/>
-            <ac:spMk id="8" creationId="{A16B15A9-8382-DAC4-0607-D404C98DF360}"/>
-          </ac:spMkLst>
-        </pc:spChg>
-        <pc:spChg chg="del">
-          <ac:chgData name="#LOR WEN SIN#" userId="f0d13d38-c6da-4a13-bbd5-986d82422d78" providerId="ADAL" clId="{3D8A7C46-7ADD-4EC1-9C73-A67BF3B1AE74}" dt="2022-12-01T18:42:42.986" v="20" actId="478"/>
-          <ac:spMkLst>
-            <pc:docMk/>
-            <pc:sldMk cId="2904309918" sldId="276"/>
-            <ac:spMk id="9" creationId="{1C703B8F-0653-B2E8-59F0-20932D084F72}"/>
-          </ac:spMkLst>
-        </pc:spChg>
-        <pc:spChg chg="del">
-          <ac:chgData name="#LOR WEN SIN#" userId="f0d13d38-c6da-4a13-bbd5-986d82422d78" providerId="ADAL" clId="{3D8A7C46-7ADD-4EC1-9C73-A67BF3B1AE74}" dt="2022-12-01T18:42:42.986" v="20" actId="478"/>
-          <ac:spMkLst>
-            <pc:docMk/>
-            <pc:sldMk cId="2904309918" sldId="276"/>
-            <ac:spMk id="10" creationId="{4B434B18-E85A-CC9F-65C7-23FFC7658A7C}"/>
-          </ac:spMkLst>
-        </pc:spChg>
-        <pc:spChg chg="del">
-          <ac:chgData name="#LOR WEN SIN#" userId="f0d13d38-c6da-4a13-bbd5-986d82422d78" providerId="ADAL" clId="{3D8A7C46-7ADD-4EC1-9C73-A67BF3B1AE74}" dt="2022-12-01T18:42:42.986" v="20" actId="478"/>
-          <ac:spMkLst>
-            <pc:docMk/>
-            <pc:sldMk cId="2904309918" sldId="276"/>
-            <ac:spMk id="11" creationId="{88009704-C336-9296-002D-2C6C0AAE5CD3}"/>
-          </ac:spMkLst>
-        </pc:spChg>
-        <pc:spChg chg="del">
-          <ac:chgData name="#LOR WEN SIN#" userId="f0d13d38-c6da-4a13-bbd5-986d82422d78" providerId="ADAL" clId="{3D8A7C46-7ADD-4EC1-9C73-A67BF3B1AE74}" dt="2022-12-01T18:42:48.135" v="22" actId="478"/>
-          <ac:spMkLst>
-            <pc:docMk/>
-            <pc:sldMk cId="2904309918" sldId="276"/>
-            <ac:spMk id="12" creationId="{8FE403C6-3DCC-91D4-0415-57254A370953}"/>
-          </ac:spMkLst>
-        </pc:spChg>
-        <pc:spChg chg="del">
-          <ac:chgData name="#LOR WEN SIN#" userId="f0d13d38-c6da-4a13-bbd5-986d82422d78" providerId="ADAL" clId="{3D8A7C46-7ADD-4EC1-9C73-A67BF3B1AE74}" dt="2022-12-01T18:42:48.135" v="22" actId="478"/>
-          <ac:spMkLst>
-            <pc:docMk/>
-            <pc:sldMk cId="2904309918" sldId="276"/>
-            <ac:spMk id="13" creationId="{CE733448-A6B6-7ACA-634F-487EB9D86A8E}"/>
-          </ac:spMkLst>
-        </pc:spChg>
-        <pc:spChg chg="add mod">
-          <ac:chgData name="#LOR WEN SIN#" userId="f0d13d38-c6da-4a13-bbd5-986d82422d78" providerId="ADAL" clId="{3D8A7C46-7ADD-4EC1-9C73-A67BF3B1AE74}" dt="2022-12-01T18:46:06.405" v="138" actId="1076"/>
-          <ac:spMkLst>
-            <pc:docMk/>
-            <pc:sldMk cId="2904309918" sldId="276"/>
-            <ac:spMk id="16" creationId="{DCFF677F-C49F-5A1A-BEC0-E4B34FB18AA7}"/>
-          </ac:spMkLst>
-        </pc:spChg>
-        <pc:spChg chg="del">
-          <ac:chgData name="#LOR WEN SIN#" userId="f0d13d38-c6da-4a13-bbd5-986d82422d78" providerId="ADAL" clId="{3D8A7C46-7ADD-4EC1-9C73-A67BF3B1AE74}" dt="2022-12-01T18:42:42.986" v="20" actId="478"/>
-          <ac:spMkLst>
-            <pc:docMk/>
-            <pc:sldMk cId="2904309918" sldId="276"/>
-            <ac:spMk id="19" creationId="{27339037-960E-82ED-8477-8653E8AEC4FB}"/>
-          </ac:spMkLst>
-        </pc:spChg>
-        <pc:spChg chg="del">
-          <ac:chgData name="#LOR WEN SIN#" userId="f0d13d38-c6da-4a13-bbd5-986d82422d78" providerId="ADAL" clId="{3D8A7C46-7ADD-4EC1-9C73-A67BF3B1AE74}" dt="2022-12-01T18:42:42.986" v="20" actId="478"/>
-          <ac:spMkLst>
-            <pc:docMk/>
-            <pc:sldMk cId="2904309918" sldId="276"/>
-            <ac:spMk id="20" creationId="{970C2948-C03E-05CC-FF84-2D259DF201E8}"/>
-          </ac:spMkLst>
-        </pc:spChg>
-        <pc:spChg chg="del">
-          <ac:chgData name="#LOR WEN SIN#" userId="f0d13d38-c6da-4a13-bbd5-986d82422d78" providerId="ADAL" clId="{3D8A7C46-7ADD-4EC1-9C73-A67BF3B1AE74}" dt="2022-12-01T18:42:42.986" v="20" actId="478"/>
-          <ac:spMkLst>
-            <pc:docMk/>
-            <pc:sldMk cId="2904309918" sldId="276"/>
-            <ac:spMk id="28" creationId="{5E7ACF6D-F4B4-EE93-25B3-C4EF0941D6F0}"/>
-          </ac:spMkLst>
-        </pc:spChg>
-        <pc:spChg chg="del">
-          <ac:chgData name="#LOR WEN SIN#" userId="f0d13d38-c6da-4a13-bbd5-986d82422d78" providerId="ADAL" clId="{3D8A7C46-7ADD-4EC1-9C73-A67BF3B1AE74}" dt="2022-12-01T18:42:42.986" v="20" actId="478"/>
-          <ac:spMkLst>
-            <pc:docMk/>
-            <pc:sldMk cId="2904309918" sldId="276"/>
-            <ac:spMk id="29" creationId="{DB8D8628-4031-907D-A8DF-3BCA29F40652}"/>
-          </ac:spMkLst>
-        </pc:spChg>
-        <pc:spChg chg="del">
-          <ac:chgData name="#LOR WEN SIN#" userId="f0d13d38-c6da-4a13-bbd5-986d82422d78" providerId="ADAL" clId="{3D8A7C46-7ADD-4EC1-9C73-A67BF3B1AE74}" dt="2022-12-01T18:42:42.986" v="20" actId="478"/>
-          <ac:spMkLst>
-            <pc:docMk/>
-            <pc:sldMk cId="2904309918" sldId="276"/>
-            <ac:spMk id="30" creationId="{CF0759BC-A708-5F79-FE19-DC985D32A509}"/>
-          </ac:spMkLst>
-        </pc:spChg>
-        <pc:spChg chg="del">
-          <ac:chgData name="#LOR WEN SIN#" userId="f0d13d38-c6da-4a13-bbd5-986d82422d78" providerId="ADAL" clId="{3D8A7C46-7ADD-4EC1-9C73-A67BF3B1AE74}" dt="2022-12-01T18:42:42.986" v="20" actId="478"/>
-          <ac:spMkLst>
-            <pc:docMk/>
-            <pc:sldMk cId="2904309918" sldId="276"/>
-            <ac:spMk id="31" creationId="{36CE6A2F-2875-C624-14EC-B0ECF1F39479}"/>
-          </ac:spMkLst>
-        </pc:spChg>
-        <pc:spChg chg="del">
-          <ac:chgData name="#LOR WEN SIN#" userId="f0d13d38-c6da-4a13-bbd5-986d82422d78" providerId="ADAL" clId="{3D8A7C46-7ADD-4EC1-9C73-A67BF3B1AE74}" dt="2022-12-01T18:42:42.986" v="20" actId="478"/>
-          <ac:spMkLst>
-            <pc:docMk/>
-            <pc:sldMk cId="2904309918" sldId="276"/>
-            <ac:spMk id="32" creationId="{F7A68474-E72A-FC1C-D6D3-91C1F5EF442C}"/>
-          </ac:spMkLst>
-        </pc:spChg>
-        <pc:spChg chg="del">
-          <ac:chgData name="#LOR WEN SIN#" userId="f0d13d38-c6da-4a13-bbd5-986d82422d78" providerId="ADAL" clId="{3D8A7C46-7ADD-4EC1-9C73-A67BF3B1AE74}" dt="2022-12-01T18:42:42.986" v="20" actId="478"/>
-          <ac:spMkLst>
-            <pc:docMk/>
-            <pc:sldMk cId="2904309918" sldId="276"/>
-            <ac:spMk id="34" creationId="{721E1785-3B4A-852A-8E83-4DC46956B3C7}"/>
-          </ac:spMkLst>
-        </pc:spChg>
-        <pc:spChg chg="del">
-          <ac:chgData name="#LOR WEN SIN#" userId="f0d13d38-c6da-4a13-bbd5-986d82422d78" providerId="ADAL" clId="{3D8A7C46-7ADD-4EC1-9C73-A67BF3B1AE74}" dt="2022-12-01T18:42:44.364" v="21" actId="478"/>
-          <ac:spMkLst>
-            <pc:docMk/>
-            <pc:sldMk cId="2904309918" sldId="276"/>
-            <ac:spMk id="39" creationId="{5E05A5BE-FE40-9CC8-1CA1-9876AD090F74}"/>
-          </ac:spMkLst>
-        </pc:spChg>
-        <pc:spChg chg="del">
-          <ac:chgData name="#LOR WEN SIN#" userId="f0d13d38-c6da-4a13-bbd5-986d82422d78" providerId="ADAL" clId="{3D8A7C46-7ADD-4EC1-9C73-A67BF3B1AE74}" dt="2022-12-01T18:42:44.364" v="21" actId="478"/>
-          <ac:spMkLst>
-            <pc:docMk/>
-            <pc:sldMk cId="2904309918" sldId="276"/>
-            <ac:spMk id="40" creationId="{A45599DB-03D0-A0CC-C62F-4984F0C79353}"/>
-          </ac:spMkLst>
-        </pc:spChg>
-        <pc:spChg chg="del">
-          <ac:chgData name="#LOR WEN SIN#" userId="f0d13d38-c6da-4a13-bbd5-986d82422d78" providerId="ADAL" clId="{3D8A7C46-7ADD-4EC1-9C73-A67BF3B1AE74}" dt="2022-12-01T18:42:49.619" v="23" actId="478"/>
-          <ac:spMkLst>
-            <pc:docMk/>
-            <pc:sldMk cId="2904309918" sldId="276"/>
-            <ac:spMk id="129" creationId="{2DEDFE72-B4DF-2F04-A6D3-6A33D7C9A79C}"/>
-          </ac:spMkLst>
-        </pc:spChg>
-        <pc:picChg chg="add mod">
-          <ac:chgData name="#LOR WEN SIN#" userId="f0d13d38-c6da-4a13-bbd5-986d82422d78" providerId="ADAL" clId="{3D8A7C46-7ADD-4EC1-9C73-A67BF3B1AE74}" dt="2022-12-01T18:45:16.582" v="58" actId="1076"/>
-          <ac:picMkLst>
-            <pc:docMk/>
-            <pc:sldMk cId="2904309918" sldId="276"/>
-            <ac:picMk id="7" creationId="{416CD740-1907-C729-BAB1-186F8A4FE9A7}"/>
-          </ac:picMkLst>
-        </pc:picChg>
-        <pc:picChg chg="add mod">
-          <ac:chgData name="#LOR WEN SIN#" userId="f0d13d38-c6da-4a13-bbd5-986d82422d78" providerId="ADAL" clId="{3D8A7C46-7ADD-4EC1-9C73-A67BF3B1AE74}" dt="2022-12-01T18:45:14.279" v="57" actId="1076"/>
-          <ac:picMkLst>
-            <pc:docMk/>
-            <pc:sldMk cId="2904309918" sldId="276"/>
-            <ac:picMk id="14" creationId="{9E1059E8-8373-0149-F570-5B967300916B}"/>
-          </ac:picMkLst>
-        </pc:picChg>
-        <pc:picChg chg="del mod">
-          <ac:chgData name="#LOR WEN SIN#" userId="f0d13d38-c6da-4a13-bbd5-986d82422d78" providerId="ADAL" clId="{3D8A7C46-7ADD-4EC1-9C73-A67BF3B1AE74}" dt="2022-12-01T18:44:44.021" v="50" actId="478"/>
-          <ac:picMkLst>
-            <pc:docMk/>
-            <pc:sldMk cId="2904309918" sldId="276"/>
-            <ac:picMk id="41" creationId="{D4809756-D938-E287-68E7-52A4F7FF5B68}"/>
-          </ac:picMkLst>
-        </pc:picChg>
-        <pc:cxnChg chg="del mod">
-          <ac:chgData name="#LOR WEN SIN#" userId="f0d13d38-c6da-4a13-bbd5-986d82422d78" providerId="ADAL" clId="{3D8A7C46-7ADD-4EC1-9C73-A67BF3B1AE74}" dt="2022-12-01T18:42:42.986" v="20" actId="478"/>
-          <ac:cxnSpMkLst>
-            <pc:docMk/>
-            <pc:sldMk cId="2904309918" sldId="276"/>
-            <ac:cxnSpMk id="15" creationId="{217CDEA4-5302-AF91-4EBD-EBAD4367F43E}"/>
-          </ac:cxnSpMkLst>
-        </pc:cxnChg>
-        <pc:cxnChg chg="del">
-          <ac:chgData name="#LOR WEN SIN#" userId="f0d13d38-c6da-4a13-bbd5-986d82422d78" providerId="ADAL" clId="{3D8A7C46-7ADD-4EC1-9C73-A67BF3B1AE74}" dt="2022-12-01T18:42:42.986" v="20" actId="478"/>
-          <ac:cxnSpMkLst>
-            <pc:docMk/>
-            <pc:sldMk cId="2904309918" sldId="276"/>
-            <ac:cxnSpMk id="18" creationId="{EAC29ECF-B420-D62D-3A27-C76D12AA2551}"/>
-          </ac:cxnSpMkLst>
-        </pc:cxnChg>
-        <pc:cxnChg chg="del mod">
-          <ac:chgData name="#LOR WEN SIN#" userId="f0d13d38-c6da-4a13-bbd5-986d82422d78" providerId="ADAL" clId="{3D8A7C46-7ADD-4EC1-9C73-A67BF3B1AE74}" dt="2022-12-01T18:42:42.986" v="20" actId="478"/>
-          <ac:cxnSpMkLst>
-            <pc:docMk/>
-            <pc:sldMk cId="2904309918" sldId="276"/>
-            <ac:cxnSpMk id="22" creationId="{83B951B0-5262-80C9-7672-25071FC507EE}"/>
-          </ac:cxnSpMkLst>
-        </pc:cxnChg>
-        <pc:cxnChg chg="del mod">
-          <ac:chgData name="#LOR WEN SIN#" userId="f0d13d38-c6da-4a13-bbd5-986d82422d78" providerId="ADAL" clId="{3D8A7C46-7ADD-4EC1-9C73-A67BF3B1AE74}" dt="2022-12-01T18:42:42.986" v="20" actId="478"/>
-          <ac:cxnSpMkLst>
-            <pc:docMk/>
-            <pc:sldMk cId="2904309918" sldId="276"/>
-            <ac:cxnSpMk id="24" creationId="{8B2E73C1-C026-9C9B-5C3D-035905B86AE4}"/>
-          </ac:cxnSpMkLst>
-        </pc:cxnChg>
-        <pc:cxnChg chg="del">
-          <ac:chgData name="#LOR WEN SIN#" userId="f0d13d38-c6da-4a13-bbd5-986d82422d78" providerId="ADAL" clId="{3D8A7C46-7ADD-4EC1-9C73-A67BF3B1AE74}" dt="2022-12-01T18:42:42.986" v="20" actId="478"/>
-          <ac:cxnSpMkLst>
-            <pc:docMk/>
-            <pc:sldMk cId="2904309918" sldId="276"/>
-            <ac:cxnSpMk id="26" creationId="{4B0EFFA7-919C-ED98-69BB-0D3F78D3B421}"/>
-          </ac:cxnSpMkLst>
-        </pc:cxnChg>
-        <pc:cxnChg chg="del mod">
-          <ac:chgData name="#LOR WEN SIN#" userId="f0d13d38-c6da-4a13-bbd5-986d82422d78" providerId="ADAL" clId="{3D8A7C46-7ADD-4EC1-9C73-A67BF3B1AE74}" dt="2022-12-01T18:42:42.986" v="20" actId="478"/>
-          <ac:cxnSpMkLst>
-            <pc:docMk/>
-            <pc:sldMk cId="2904309918" sldId="276"/>
-            <ac:cxnSpMk id="38" creationId="{8BF6D69D-4F30-6A12-E99D-19F39C260112}"/>
-          </ac:cxnSpMkLst>
-        </pc:cxnChg>
-      </pc:sldChg>
-      <pc:sldChg chg="addSp delSp modSp add mod ord">
-        <pc:chgData name="#LOR WEN SIN#" userId="f0d13d38-c6da-4a13-bbd5-986d82422d78" providerId="ADAL" clId="{3D8A7C46-7ADD-4EC1-9C73-A67BF3B1AE74}" dt="2022-12-01T18:47:16.585" v="222" actId="1076"/>
-        <pc:sldMkLst>
-          <pc:docMk/>
-          <pc:sldMk cId="2132711477" sldId="277"/>
-        </pc:sldMkLst>
-        <pc:spChg chg="add mod">
-          <ac:chgData name="#LOR WEN SIN#" userId="f0d13d38-c6da-4a13-bbd5-986d82422d78" providerId="ADAL" clId="{3D8A7C46-7ADD-4EC1-9C73-A67BF3B1AE74}" dt="2022-12-01T18:47:16.585" v="222" actId="1076"/>
-          <ac:spMkLst>
-            <pc:docMk/>
-            <pc:sldMk cId="2132711477" sldId="277"/>
-            <ac:spMk id="3" creationId="{6903075D-904E-CB0D-57E5-9E06A3AC46FD}"/>
-          </ac:spMkLst>
-        </pc:spChg>
-        <pc:picChg chg="del">
-          <ac:chgData name="#LOR WEN SIN#" userId="f0d13d38-c6da-4a13-bbd5-986d82422d78" providerId="ADAL" clId="{3D8A7C46-7ADD-4EC1-9C73-A67BF3B1AE74}" dt="2022-12-01T18:44:19.409" v="42" actId="478"/>
-          <ac:picMkLst>
-            <pc:docMk/>
-            <pc:sldMk cId="2132711477" sldId="277"/>
-            <ac:picMk id="7" creationId="{416CD740-1907-C729-BAB1-186F8A4FE9A7}"/>
-          </ac:picMkLst>
-        </pc:picChg>
-        <pc:picChg chg="del">
-          <ac:chgData name="#LOR WEN SIN#" userId="f0d13d38-c6da-4a13-bbd5-986d82422d78" providerId="ADAL" clId="{3D8A7C46-7ADD-4EC1-9C73-A67BF3B1AE74}" dt="2022-12-01T18:44:19.868" v="43" actId="478"/>
-          <ac:picMkLst>
-            <pc:docMk/>
-            <pc:sldMk cId="2132711477" sldId="277"/>
-            <ac:picMk id="14" creationId="{9E1059E8-8373-0149-F570-5B967300916B}"/>
-          </ac:picMkLst>
-        </pc:picChg>
-        <pc:picChg chg="mod">
-          <ac:chgData name="#LOR WEN SIN#" userId="f0d13d38-c6da-4a13-bbd5-986d82422d78" providerId="ADAL" clId="{3D8A7C46-7ADD-4EC1-9C73-A67BF3B1AE74}" dt="2022-12-01T18:44:30.779" v="47" actId="1076"/>
-          <ac:picMkLst>
-            <pc:docMk/>
-            <pc:sldMk cId="2132711477" sldId="277"/>
-            <ac:picMk id="41" creationId="{D4809756-D938-E287-68E7-52A4F7FF5B68}"/>
-          </ac:picMkLst>
-        </pc:picChg>
-      </pc:sldChg>
-      <pc:sldChg chg="addSp delSp modSp add mod ord">
-        <pc:chgData name="#LOR WEN SIN#" userId="f0d13d38-c6da-4a13-bbd5-986d82422d78" providerId="ADAL" clId="{3D8A7C46-7ADD-4EC1-9C73-A67BF3B1AE74}" dt="2022-12-01T18:48:44.710" v="289" actId="1076"/>
-        <pc:sldMkLst>
-          <pc:docMk/>
-          <pc:sldMk cId="173527197" sldId="278"/>
-        </pc:sldMkLst>
-        <pc:spChg chg="add del mod">
-          <ac:chgData name="#LOR WEN SIN#" userId="f0d13d38-c6da-4a13-bbd5-986d82422d78" providerId="ADAL" clId="{3D8A7C46-7ADD-4EC1-9C73-A67BF3B1AE74}" dt="2022-12-01T18:48:39.273" v="287" actId="1076"/>
-          <ac:spMkLst>
-            <pc:docMk/>
-            <pc:sldMk cId="173527197" sldId="278"/>
-            <ac:spMk id="16" creationId="{DCFF677F-C49F-5A1A-BEC0-E4B34FB18AA7}"/>
-          </ac:spMkLst>
-        </pc:spChg>
-        <pc:picChg chg="add mod">
-          <ac:chgData name="#LOR WEN SIN#" userId="f0d13d38-c6da-4a13-bbd5-986d82422d78" providerId="ADAL" clId="{3D8A7C46-7ADD-4EC1-9C73-A67BF3B1AE74}" dt="2022-12-01T18:48:44.710" v="289" actId="1076"/>
-          <ac:picMkLst>
-            <pc:docMk/>
-            <pc:sldMk cId="173527197" sldId="278"/>
-            <ac:picMk id="3" creationId="{F3AAA99E-1C7F-0F2F-D9E3-52DF83820145}"/>
-          </ac:picMkLst>
-        </pc:picChg>
-        <pc:picChg chg="del">
-          <ac:chgData name="#LOR WEN SIN#" userId="f0d13d38-c6da-4a13-bbd5-986d82422d78" providerId="ADAL" clId="{3D8A7C46-7ADD-4EC1-9C73-A67BF3B1AE74}" dt="2022-12-01T18:47:50.774" v="229" actId="478"/>
-          <ac:picMkLst>
-            <pc:docMk/>
-            <pc:sldMk cId="173527197" sldId="278"/>
-            <ac:picMk id="7" creationId="{416CD740-1907-C729-BAB1-186F8A4FE9A7}"/>
-          </ac:picMkLst>
-        </pc:picChg>
-        <pc:picChg chg="del">
-          <ac:chgData name="#LOR WEN SIN#" userId="f0d13d38-c6da-4a13-bbd5-986d82422d78" providerId="ADAL" clId="{3D8A7C46-7ADD-4EC1-9C73-A67BF3B1AE74}" dt="2022-12-01T18:47:51.238" v="230" actId="478"/>
-          <ac:picMkLst>
-            <pc:docMk/>
-            <pc:sldMk cId="173527197" sldId="278"/>
-            <ac:picMk id="14" creationId="{9E1059E8-8373-0149-F570-5B967300916B}"/>
-          </ac:picMkLst>
-        </pc:picChg>
-      </pc:sldChg>
-      <pc:sldChg chg="modSp add mod ord">
-        <pc:chgData name="#LOR WEN SIN#" userId="f0d13d38-c6da-4a13-bbd5-986d82422d78" providerId="ADAL" clId="{3D8A7C46-7ADD-4EC1-9C73-A67BF3B1AE74}" dt="2022-12-01T18:49:19.076" v="293" actId="1076"/>
-        <pc:sldMkLst>
-          <pc:docMk/>
-          <pc:sldMk cId="2725808673" sldId="279"/>
-        </pc:sldMkLst>
-        <pc:spChg chg="mod">
-          <ac:chgData name="#LOR WEN SIN#" userId="f0d13d38-c6da-4a13-bbd5-986d82422d78" providerId="ADAL" clId="{3D8A7C46-7ADD-4EC1-9C73-A67BF3B1AE74}" dt="2022-12-01T18:49:19.076" v="293" actId="1076"/>
-          <ac:spMkLst>
-            <pc:docMk/>
-            <pc:sldMk cId="2725808673" sldId="279"/>
-            <ac:spMk id="5" creationId="{835114DF-08F6-34B8-CB4B-48FB882CDB9E}"/>
-          </ac:spMkLst>
-        </pc:spChg>
-      </pc:sldChg>
-      <pc:sldChg chg="addSp delSp modSp add mod ord">
-        <pc:chgData name="#LOR WEN SIN#" userId="f0d13d38-c6da-4a13-bbd5-986d82422d78" providerId="ADAL" clId="{3D8A7C46-7ADD-4EC1-9C73-A67BF3B1AE74}" dt="2022-12-01T18:54:57.275" v="451" actId="1036"/>
-        <pc:sldMkLst>
-          <pc:docMk/>
-          <pc:sldMk cId="2713900647" sldId="280"/>
-        </pc:sldMkLst>
-        <pc:spChg chg="mod">
-          <ac:chgData name="#LOR WEN SIN#" userId="f0d13d38-c6da-4a13-bbd5-986d82422d78" providerId="ADAL" clId="{3D8A7C46-7ADD-4EC1-9C73-A67BF3B1AE74}" dt="2022-12-01T18:50:09.219" v="302" actId="27636"/>
-          <ac:spMkLst>
-            <pc:docMk/>
-            <pc:sldMk cId="2713900647" sldId="280"/>
-            <ac:spMk id="2" creationId="{7A52E233-DA80-5A3A-534F-8A98B545F1D9}"/>
-          </ac:spMkLst>
-        </pc:spChg>
-        <pc:spChg chg="mod">
-          <ac:chgData name="#LOR WEN SIN#" userId="f0d13d38-c6da-4a13-bbd5-986d82422d78" providerId="ADAL" clId="{3D8A7C46-7ADD-4EC1-9C73-A67BF3B1AE74}" dt="2022-12-01T18:51:43.123" v="435" actId="14100"/>
-          <ac:spMkLst>
-            <pc:docMk/>
-            <pc:sldMk cId="2713900647" sldId="280"/>
-            <ac:spMk id="16" creationId="{DCFF677F-C49F-5A1A-BEC0-E4B34FB18AA7}"/>
-          </ac:spMkLst>
-        </pc:spChg>
-        <pc:picChg chg="del">
-          <ac:chgData name="#LOR WEN SIN#" userId="f0d13d38-c6da-4a13-bbd5-986d82422d78" providerId="ADAL" clId="{3D8A7C46-7ADD-4EC1-9C73-A67BF3B1AE74}" dt="2022-12-01T18:49:55.705" v="297" actId="478"/>
-          <ac:picMkLst>
-            <pc:docMk/>
-            <pc:sldMk cId="2713900647" sldId="280"/>
-            <ac:picMk id="3" creationId="{F3AAA99E-1C7F-0F2F-D9E3-52DF83820145}"/>
-          </ac:picMkLst>
-        </pc:picChg>
-        <pc:picChg chg="add mod">
-          <ac:chgData name="#LOR WEN SIN#" userId="f0d13d38-c6da-4a13-bbd5-986d82422d78" providerId="ADAL" clId="{3D8A7C46-7ADD-4EC1-9C73-A67BF3B1AE74}" dt="2022-12-01T18:54:57.275" v="451" actId="1036"/>
-          <ac:picMkLst>
-            <pc:docMk/>
-            <pc:sldMk cId="2713900647" sldId="280"/>
-            <ac:picMk id="4" creationId="{062730DC-AD33-E744-A459-0214A113117B}"/>
-          </ac:picMkLst>
-        </pc:picChg>
-      </pc:sldChg>
-      <pc:sldChg chg="modSp add mod ord">
-        <pc:chgData name="#LOR WEN SIN#" userId="f0d13d38-c6da-4a13-bbd5-986d82422d78" providerId="ADAL" clId="{3D8A7C46-7ADD-4EC1-9C73-A67BF3B1AE74}" dt="2022-12-01T18:52:18.598" v="441" actId="1076"/>
-        <pc:sldMkLst>
-          <pc:docMk/>
-          <pc:sldMk cId="148900624" sldId="281"/>
-        </pc:sldMkLst>
-        <pc:spChg chg="mod">
-          <ac:chgData name="#LOR WEN SIN#" userId="f0d13d38-c6da-4a13-bbd5-986d82422d78" providerId="ADAL" clId="{3D8A7C46-7ADD-4EC1-9C73-A67BF3B1AE74}" dt="2022-12-01T18:52:18.598" v="441" actId="1076"/>
-          <ac:spMkLst>
-            <pc:docMk/>
-            <pc:sldMk cId="148900624" sldId="281"/>
-            <ac:spMk id="5" creationId="{835114DF-08F6-34B8-CB4B-48FB882CDB9E}"/>
-          </ac:spMkLst>
-        </pc:spChg>
-      </pc:sldChg>
-      <pc:sldChg chg="addSp delSp modSp add mod ord">
-        <pc:chgData name="#LOR WEN SIN#" userId="f0d13d38-c6da-4a13-bbd5-986d82422d78" providerId="ADAL" clId="{3D8A7C46-7ADD-4EC1-9C73-A67BF3B1AE74}" dt="2022-12-01T19:16:48.460" v="806" actId="14100"/>
-        <pc:sldMkLst>
-          <pc:docMk/>
-          <pc:sldMk cId="190251951" sldId="282"/>
-        </pc:sldMkLst>
-        <pc:spChg chg="add mod">
-          <ac:chgData name="#LOR WEN SIN#" userId="f0d13d38-c6da-4a13-bbd5-986d82422d78" providerId="ADAL" clId="{3D8A7C46-7ADD-4EC1-9C73-A67BF3B1AE74}" dt="2022-12-01T19:05:26.658" v="474" actId="14100"/>
-          <ac:spMkLst>
-            <pc:docMk/>
-            <pc:sldMk cId="190251951" sldId="282"/>
-            <ac:spMk id="10" creationId="{1E6A8503-9B42-4125-B3E1-0F2E44E6D342}"/>
-          </ac:spMkLst>
-        </pc:spChg>
-        <pc:spChg chg="add del mod">
-          <ac:chgData name="#LOR WEN SIN#" userId="f0d13d38-c6da-4a13-bbd5-986d82422d78" providerId="ADAL" clId="{3D8A7C46-7ADD-4EC1-9C73-A67BF3B1AE74}" dt="2022-12-01T19:08:48.477" v="479" actId="478"/>
-          <ac:spMkLst>
-            <pc:docMk/>
-            <pc:sldMk cId="190251951" sldId="282"/>
-            <ac:spMk id="11" creationId="{7F5C0684-28A7-9D8B-D7C0-E8EECCEA9CF2}"/>
-          </ac:spMkLst>
-        </pc:spChg>
-        <pc:spChg chg="add mod">
-          <ac:chgData name="#LOR WEN SIN#" userId="f0d13d38-c6da-4a13-bbd5-986d82422d78" providerId="ADAL" clId="{3D8A7C46-7ADD-4EC1-9C73-A67BF3B1AE74}" dt="2022-12-01T19:09:33.671" v="481" actId="1076"/>
-          <ac:spMkLst>
-            <pc:docMk/>
-            <pc:sldMk cId="190251951" sldId="282"/>
-            <ac:spMk id="13" creationId="{A1AA63EC-8105-27A0-ABAE-81B7136EB96A}"/>
-          </ac:spMkLst>
-        </pc:spChg>
-        <pc:spChg chg="add mod">
-          <ac:chgData name="#LOR WEN SIN#" userId="f0d13d38-c6da-4a13-bbd5-986d82422d78" providerId="ADAL" clId="{3D8A7C46-7ADD-4EC1-9C73-A67BF3B1AE74}" dt="2022-12-01T19:09:38.974" v="483" actId="1076"/>
-          <ac:spMkLst>
-            <pc:docMk/>
-            <pc:sldMk cId="190251951" sldId="282"/>
-            <ac:spMk id="14" creationId="{49DCD358-50B1-79A8-2593-AFA1BD32BB67}"/>
-          </ac:spMkLst>
-        </pc:spChg>
-        <pc:spChg chg="add mod">
-          <ac:chgData name="#LOR WEN SIN#" userId="f0d13d38-c6da-4a13-bbd5-986d82422d78" providerId="ADAL" clId="{3D8A7C46-7ADD-4EC1-9C73-A67BF3B1AE74}" dt="2022-12-01T19:09:51.236" v="485" actId="1076"/>
-          <ac:spMkLst>
-            <pc:docMk/>
-            <pc:sldMk cId="190251951" sldId="282"/>
-            <ac:spMk id="15" creationId="{1E324E68-E22F-CFA4-00DC-2CDCE8AC73EB}"/>
-          </ac:spMkLst>
-        </pc:spChg>
-        <pc:spChg chg="del">
-          <ac:chgData name="#LOR WEN SIN#" userId="f0d13d38-c6da-4a13-bbd5-986d82422d78" providerId="ADAL" clId="{3D8A7C46-7ADD-4EC1-9C73-A67BF3B1AE74}" dt="2022-12-01T18:52:33.672" v="446" actId="478"/>
-          <ac:spMkLst>
-            <pc:docMk/>
-            <pc:sldMk cId="190251951" sldId="282"/>
-            <ac:spMk id="16" creationId="{DCFF677F-C49F-5A1A-BEC0-E4B34FB18AA7}"/>
-          </ac:spMkLst>
-        </pc:spChg>
-        <pc:spChg chg="add mod">
-          <ac:chgData name="#LOR WEN SIN#" userId="f0d13d38-c6da-4a13-bbd5-986d82422d78" providerId="ADAL" clId="{3D8A7C46-7ADD-4EC1-9C73-A67BF3B1AE74}" dt="2022-12-01T19:09:55.030" v="487" actId="1076"/>
-          <ac:spMkLst>
-            <pc:docMk/>
-            <pc:sldMk cId="190251951" sldId="282"/>
-            <ac:spMk id="17" creationId="{56B49E62-FD90-3624-ED68-C3171E6B5472}"/>
-          </ac:spMkLst>
-        </pc:spChg>
-        <pc:spChg chg="add mod">
-          <ac:chgData name="#LOR WEN SIN#" userId="f0d13d38-c6da-4a13-bbd5-986d82422d78" providerId="ADAL" clId="{3D8A7C46-7ADD-4EC1-9C73-A67BF3B1AE74}" dt="2022-12-01T19:09:58.271" v="489" actId="1076"/>
-          <ac:spMkLst>
-            <pc:docMk/>
-            <pc:sldMk cId="190251951" sldId="282"/>
-            <ac:spMk id="18" creationId="{6CA87DC2-61AD-2986-54AA-17690D1F8798}"/>
-          </ac:spMkLst>
-        </pc:spChg>
-        <pc:spChg chg="add mod">
-          <ac:chgData name="#LOR WEN SIN#" userId="f0d13d38-c6da-4a13-bbd5-986d82422d78" providerId="ADAL" clId="{3D8A7C46-7ADD-4EC1-9C73-A67BF3B1AE74}" dt="2022-12-01T19:10:30.565" v="505" actId="1076"/>
-          <ac:spMkLst>
-            <pc:docMk/>
-            <pc:sldMk cId="190251951" sldId="282"/>
-            <ac:spMk id="20" creationId="{FF8B8A38-06D4-C0C8-CB60-6D42D4099B8B}"/>
-          </ac:spMkLst>
-        </pc:spChg>
-        <pc:spChg chg="add mod">
-          <ac:chgData name="#LOR WEN SIN#" userId="f0d13d38-c6da-4a13-bbd5-986d82422d78" providerId="ADAL" clId="{3D8A7C46-7ADD-4EC1-9C73-A67BF3B1AE74}" dt="2022-12-01T19:10:44.726" v="512" actId="1076"/>
-          <ac:spMkLst>
-            <pc:docMk/>
-            <pc:sldMk cId="190251951" sldId="282"/>
-            <ac:spMk id="21" creationId="{0F34583B-436D-086B-0CC2-7044E8F65C89}"/>
-          </ac:spMkLst>
-        </pc:spChg>
-        <pc:spChg chg="add mod">
-          <ac:chgData name="#LOR WEN SIN#" userId="f0d13d38-c6da-4a13-bbd5-986d82422d78" providerId="ADAL" clId="{3D8A7C46-7ADD-4EC1-9C73-A67BF3B1AE74}" dt="2022-12-01T19:10:52.074" v="516" actId="20577"/>
-          <ac:spMkLst>
-            <pc:docMk/>
-            <pc:sldMk cId="190251951" sldId="282"/>
-            <ac:spMk id="22" creationId="{9CBC419B-3D9C-C947-B5CC-57AB70971094}"/>
-          </ac:spMkLst>
-        </pc:spChg>
-        <pc:spChg chg="add mod">
-          <ac:chgData name="#LOR WEN SIN#" userId="f0d13d38-c6da-4a13-bbd5-986d82422d78" providerId="ADAL" clId="{3D8A7C46-7ADD-4EC1-9C73-A67BF3B1AE74}" dt="2022-12-01T19:11:53.898" v="525" actId="20577"/>
-          <ac:spMkLst>
-            <pc:docMk/>
-            <pc:sldMk cId="190251951" sldId="282"/>
-            <ac:spMk id="26" creationId="{C62B91F9-3A45-AE70-10FE-29DD4D9760E1}"/>
-          </ac:spMkLst>
-        </pc:spChg>
-        <pc:spChg chg="add mod">
-          <ac:chgData name="#LOR WEN SIN#" userId="f0d13d38-c6da-4a13-bbd5-986d82422d78" providerId="ADAL" clId="{3D8A7C46-7ADD-4EC1-9C73-A67BF3B1AE74}" dt="2022-12-01T19:12:16.466" v="533" actId="1076"/>
-          <ac:spMkLst>
-            <pc:docMk/>
-            <pc:sldMk cId="190251951" sldId="282"/>
-            <ac:spMk id="27" creationId="{041B9BF4-BFA7-FC69-A198-837242CB2AAF}"/>
-          </ac:spMkLst>
-        </pc:spChg>
-        <pc:spChg chg="add mod">
-          <ac:chgData name="#LOR WEN SIN#" userId="f0d13d38-c6da-4a13-bbd5-986d82422d78" providerId="ADAL" clId="{3D8A7C46-7ADD-4EC1-9C73-A67BF3B1AE74}" dt="2022-12-01T19:12:47.029" v="538" actId="207"/>
-          <ac:spMkLst>
-            <pc:docMk/>
-            <pc:sldMk cId="190251951" sldId="282"/>
-            <ac:spMk id="30" creationId="{7AB09CB1-9DE0-7FC1-B0F7-329CDE89201B}"/>
-          </ac:spMkLst>
-        </pc:spChg>
-        <pc:spChg chg="add mod">
-          <ac:chgData name="#LOR WEN SIN#" userId="f0d13d38-c6da-4a13-bbd5-986d82422d78" providerId="ADAL" clId="{3D8A7C46-7ADD-4EC1-9C73-A67BF3B1AE74}" dt="2022-12-01T19:12:41.473" v="537" actId="207"/>
-          <ac:spMkLst>
-            <pc:docMk/>
-            <pc:sldMk cId="190251951" sldId="282"/>
-            <ac:spMk id="31" creationId="{19FCEC16-8BE9-76E1-6ED3-CCA56742F3B4}"/>
-          </ac:spMkLst>
-        </pc:spChg>
-        <pc:spChg chg="add mod">
-          <ac:chgData name="#LOR WEN SIN#" userId="f0d13d38-c6da-4a13-bbd5-986d82422d78" providerId="ADAL" clId="{3D8A7C46-7ADD-4EC1-9C73-A67BF3B1AE74}" dt="2022-12-01T19:12:34.962" v="536" actId="207"/>
-          <ac:spMkLst>
-            <pc:docMk/>
-            <pc:sldMk cId="190251951" sldId="282"/>
-            <ac:spMk id="32" creationId="{9F67E1F1-0887-AC5C-5172-916BFA42A4D0}"/>
-          </ac:spMkLst>
-        </pc:spChg>
-        <pc:spChg chg="add mod">
-          <ac:chgData name="#LOR WEN SIN#" userId="f0d13d38-c6da-4a13-bbd5-986d82422d78" providerId="ADAL" clId="{3D8A7C46-7ADD-4EC1-9C73-A67BF3B1AE74}" dt="2022-12-01T19:13:01.039" v="541" actId="207"/>
-          <ac:spMkLst>
-            <pc:docMk/>
-            <pc:sldMk cId="190251951" sldId="282"/>
-            <ac:spMk id="33" creationId="{D0E6BE9D-49A1-7858-56A5-4837C0EF5200}"/>
-          </ac:spMkLst>
-        </pc:spChg>
-        <pc:spChg chg="add mod">
-          <ac:chgData name="#LOR WEN SIN#" userId="f0d13d38-c6da-4a13-bbd5-986d82422d78" providerId="ADAL" clId="{3D8A7C46-7ADD-4EC1-9C73-A67BF3B1AE74}" dt="2022-12-01T19:12:55.287" v="540" actId="207"/>
-          <ac:spMkLst>
-            <pc:docMk/>
-            <pc:sldMk cId="190251951" sldId="282"/>
-            <ac:spMk id="34" creationId="{D2DB140E-41A2-68DF-C167-633E1BC39398}"/>
-          </ac:spMkLst>
-        </pc:spChg>
-        <pc:spChg chg="add mod">
-          <ac:chgData name="#LOR WEN SIN#" userId="f0d13d38-c6da-4a13-bbd5-986d82422d78" providerId="ADAL" clId="{3D8A7C46-7ADD-4EC1-9C73-A67BF3B1AE74}" dt="2022-12-01T19:12:50.779" v="539" actId="207"/>
-          <ac:spMkLst>
-            <pc:docMk/>
-            <pc:sldMk cId="190251951" sldId="282"/>
-            <ac:spMk id="35" creationId="{7DCE24C6-81C1-9716-4522-1B68AFD79061}"/>
-          </ac:spMkLst>
-        </pc:spChg>
-        <pc:spChg chg="add mod">
-          <ac:chgData name="#LOR WEN SIN#" userId="f0d13d38-c6da-4a13-bbd5-986d82422d78" providerId="ADAL" clId="{3D8A7C46-7ADD-4EC1-9C73-A67BF3B1AE74}" dt="2022-12-01T19:12:24.680" v="535" actId="1076"/>
-          <ac:spMkLst>
-            <pc:docMk/>
-            <pc:sldMk cId="190251951" sldId="282"/>
-            <ac:spMk id="36" creationId="{01E3DFEF-0352-F429-2267-ED285EE5218B}"/>
-          </ac:spMkLst>
-        </pc:spChg>
-        <pc:spChg chg="add mod">
-          <ac:chgData name="#LOR WEN SIN#" userId="f0d13d38-c6da-4a13-bbd5-986d82422d78" providerId="ADAL" clId="{3D8A7C46-7ADD-4EC1-9C73-A67BF3B1AE74}" dt="2022-12-01T19:12:24.680" v="535" actId="1076"/>
-          <ac:spMkLst>
-            <pc:docMk/>
-            <pc:sldMk cId="190251951" sldId="282"/>
-            <ac:spMk id="37" creationId="{0680C610-EBBB-618B-F904-0FB0599DFEB6}"/>
-          </ac:spMkLst>
-        </pc:spChg>
-        <pc:spChg chg="add mod">
-          <ac:chgData name="#LOR WEN SIN#" userId="f0d13d38-c6da-4a13-bbd5-986d82422d78" providerId="ADAL" clId="{3D8A7C46-7ADD-4EC1-9C73-A67BF3B1AE74}" dt="2022-12-01T19:12:24.680" v="535" actId="1076"/>
-          <ac:spMkLst>
-            <pc:docMk/>
-            <pc:sldMk cId="190251951" sldId="282"/>
-            <ac:spMk id="38" creationId="{82CABA58-69C5-135E-EFBF-1227A71154DC}"/>
-          </ac:spMkLst>
-        </pc:spChg>
-        <pc:spChg chg="add mod">
-          <ac:chgData name="#LOR WEN SIN#" userId="f0d13d38-c6da-4a13-bbd5-986d82422d78" providerId="ADAL" clId="{3D8A7C46-7ADD-4EC1-9C73-A67BF3B1AE74}" dt="2022-12-01T19:16:24.032" v="794" actId="14100"/>
-          <ac:spMkLst>
-            <pc:docMk/>
-            <pc:sldMk cId="190251951" sldId="282"/>
-            <ac:spMk id="41" creationId="{83F8600E-B434-F5C9-7DCE-04CF095BC85A}"/>
-          </ac:spMkLst>
-        </pc:spChg>
-        <pc:spChg chg="add mod">
-          <ac:chgData name="#LOR WEN SIN#" userId="f0d13d38-c6da-4a13-bbd5-986d82422d78" providerId="ADAL" clId="{3D8A7C46-7ADD-4EC1-9C73-A67BF3B1AE74}" dt="2022-12-01T19:16:48.460" v="806" actId="14100"/>
-          <ac:spMkLst>
-            <pc:docMk/>
-            <pc:sldMk cId="190251951" sldId="282"/>
-            <ac:spMk id="42" creationId="{A63209E4-06CC-6630-615F-F3274C8D6373}"/>
-          </ac:spMkLst>
-        </pc:spChg>
-        <pc:spChg chg="add mod">
-          <ac:chgData name="#LOR WEN SIN#" userId="f0d13d38-c6da-4a13-bbd5-986d82422d78" providerId="ADAL" clId="{3D8A7C46-7ADD-4EC1-9C73-A67BF3B1AE74}" dt="2022-12-01T19:16:11.191" v="791" actId="1076"/>
-          <ac:spMkLst>
-            <pc:docMk/>
-            <pc:sldMk cId="190251951" sldId="282"/>
-            <ac:spMk id="43" creationId="{8B1F8C9E-938D-DEE3-902A-7B32D26202EF}"/>
-          </ac:spMkLst>
-        </pc:spChg>
-        <pc:picChg chg="add del mod">
-          <ac:chgData name="#LOR WEN SIN#" userId="f0d13d38-c6da-4a13-bbd5-986d82422d78" providerId="ADAL" clId="{3D8A7C46-7ADD-4EC1-9C73-A67BF3B1AE74}" dt="2022-12-01T19:02:02.029" v="462" actId="478"/>
-          <ac:picMkLst>
-            <pc:docMk/>
-            <pc:sldMk cId="190251951" sldId="282"/>
-            <ac:picMk id="3" creationId="{E371C36C-314D-FE80-423B-F2B564FC49E9}"/>
-          </ac:picMkLst>
-        </pc:picChg>
-        <pc:picChg chg="del">
-          <ac:chgData name="#LOR WEN SIN#" userId="f0d13d38-c6da-4a13-bbd5-986d82422d78" providerId="ADAL" clId="{3D8A7C46-7ADD-4EC1-9C73-A67BF3B1AE74}" dt="2022-12-01T18:52:31.998" v="445" actId="478"/>
-          <ac:picMkLst>
-            <pc:docMk/>
-            <pc:sldMk cId="190251951" sldId="282"/>
-            <ac:picMk id="4" creationId="{062730DC-AD33-E744-A459-0214A113117B}"/>
-          </ac:picMkLst>
-        </pc:picChg>
-        <pc:picChg chg="add del mod">
-          <ac:chgData name="#LOR WEN SIN#" userId="f0d13d38-c6da-4a13-bbd5-986d82422d78" providerId="ADAL" clId="{3D8A7C46-7ADD-4EC1-9C73-A67BF3B1AE74}" dt="2022-12-01T19:02:01.575" v="461" actId="478"/>
-          <ac:picMkLst>
-            <pc:docMk/>
-            <pc:sldMk cId="190251951" sldId="282"/>
-            <ac:picMk id="5" creationId="{07330349-2849-31B4-D740-02A9ACFC0EDE}"/>
-          </ac:picMkLst>
-        </pc:picChg>
-        <pc:cxnChg chg="add mod">
-          <ac:chgData name="#LOR WEN SIN#" userId="f0d13d38-c6da-4a13-bbd5-986d82422d78" providerId="ADAL" clId="{3D8A7C46-7ADD-4EC1-9C73-A67BF3B1AE74}" dt="2022-12-01T19:02:15.222" v="464" actId="208"/>
-          <ac:cxnSpMkLst>
-            <pc:docMk/>
-            <pc:sldMk cId="190251951" sldId="282"/>
-            <ac:cxnSpMk id="7" creationId="{9AA0F4AA-070F-0ED6-B0F5-9435B5F08415}"/>
-          </ac:cxnSpMkLst>
-        </pc:cxnChg>
-        <pc:cxnChg chg="add mod">
-          <ac:chgData name="#LOR WEN SIN#" userId="f0d13d38-c6da-4a13-bbd5-986d82422d78" providerId="ADAL" clId="{3D8A7C46-7ADD-4EC1-9C73-A67BF3B1AE74}" dt="2022-12-01T19:10:02.980" v="490" actId="14100"/>
-          <ac:cxnSpMkLst>
-            <pc:docMk/>
-            <pc:sldMk cId="190251951" sldId="282"/>
-            <ac:cxnSpMk id="9" creationId="{A13AEA8A-8596-45C2-AF7F-AF817325BB01}"/>
-          </ac:cxnSpMkLst>
-        </pc:cxnChg>
-        <pc:cxnChg chg="add mod">
-          <ac:chgData name="#LOR WEN SIN#" userId="f0d13d38-c6da-4a13-bbd5-986d82422d78" providerId="ADAL" clId="{3D8A7C46-7ADD-4EC1-9C73-A67BF3B1AE74}" dt="2022-12-01T19:11:34.856" v="519" actId="208"/>
-          <ac:cxnSpMkLst>
-            <pc:docMk/>
-            <pc:sldMk cId="190251951" sldId="282"/>
-            <ac:cxnSpMk id="24" creationId="{7D7A1A2D-FEBA-BC9C-D2D5-C7EBEEC64C1C}"/>
-          </ac:cxnSpMkLst>
-        </pc:cxnChg>
-        <pc:cxnChg chg="add mod">
-          <ac:chgData name="#LOR WEN SIN#" userId="f0d13d38-c6da-4a13-bbd5-986d82422d78" providerId="ADAL" clId="{3D8A7C46-7ADD-4EC1-9C73-A67BF3B1AE74}" dt="2022-12-01T19:11:40.452" v="521" actId="1076"/>
-          <ac:cxnSpMkLst>
-            <pc:docMk/>
-            <pc:sldMk cId="190251951" sldId="282"/>
-            <ac:cxnSpMk id="25" creationId="{F9E03032-2623-721C-1D67-19CF5A52E04D}"/>
-          </ac:cxnSpMkLst>
-        </pc:cxnChg>
-        <pc:cxnChg chg="add mod">
-          <ac:chgData name="#LOR WEN SIN#" userId="f0d13d38-c6da-4a13-bbd5-986d82422d78" providerId="ADAL" clId="{3D8A7C46-7ADD-4EC1-9C73-A67BF3B1AE74}" dt="2022-12-01T19:12:24.680" v="535" actId="1076"/>
-          <ac:cxnSpMkLst>
-            <pc:docMk/>
-            <pc:sldMk cId="190251951" sldId="282"/>
-            <ac:cxnSpMk id="28" creationId="{66529211-2B92-079D-2FC2-979AB1F92CEC}"/>
-          </ac:cxnSpMkLst>
-        </pc:cxnChg>
-        <pc:cxnChg chg="add mod">
-          <ac:chgData name="#LOR WEN SIN#" userId="f0d13d38-c6da-4a13-bbd5-986d82422d78" providerId="ADAL" clId="{3D8A7C46-7ADD-4EC1-9C73-A67BF3B1AE74}" dt="2022-12-01T19:12:24.680" v="535" actId="1076"/>
-          <ac:cxnSpMkLst>
-            <pc:docMk/>
-            <pc:sldMk cId="190251951" sldId="282"/>
-            <ac:cxnSpMk id="29" creationId="{6CED82BE-FD16-3926-5BE5-25A85D0F9140}"/>
-          </ac:cxnSpMkLst>
-        </pc:cxnChg>
-        <pc:cxnChg chg="add mod">
-          <ac:chgData name="#LOR WEN SIN#" userId="f0d13d38-c6da-4a13-bbd5-986d82422d78" providerId="ADAL" clId="{3D8A7C46-7ADD-4EC1-9C73-A67BF3B1AE74}" dt="2022-12-01T19:13:09.359" v="543" actId="208"/>
-          <ac:cxnSpMkLst>
-            <pc:docMk/>
-            <pc:sldMk cId="190251951" sldId="282"/>
-            <ac:cxnSpMk id="39" creationId="{4E289B8B-7257-AB86-FAB1-DD61C7CE7859}"/>
-          </ac:cxnSpMkLst>
-        </pc:cxnChg>
-        <pc:cxnChg chg="add mod">
-          <ac:chgData name="#LOR WEN SIN#" userId="f0d13d38-c6da-4a13-bbd5-986d82422d78" providerId="ADAL" clId="{3D8A7C46-7ADD-4EC1-9C73-A67BF3B1AE74}" dt="2022-12-01T19:13:05.765" v="542" actId="208"/>
-          <ac:cxnSpMkLst>
-            <pc:docMk/>
-            <pc:sldMk cId="190251951" sldId="282"/>
-            <ac:cxnSpMk id="40" creationId="{B46613AB-1E03-3ED2-3837-E01B0A125E00}"/>
-          </ac:cxnSpMkLst>
-        </pc:cxnChg>
-      </pc:sldChg>
-      <pc:sldChg chg="add">
-        <pc:chgData name="#LOR WEN SIN#" userId="f0d13d38-c6da-4a13-bbd5-986d82422d78" providerId="ADAL" clId="{3D8A7C46-7ADD-4EC1-9C73-A67BF3B1AE74}" dt="2022-12-01T19:01:59.702" v="460" actId="2890"/>
-        <pc:sldMkLst>
-          <pc:docMk/>
-          <pc:sldMk cId="2353562641" sldId="283"/>
-        </pc:sldMkLst>
       </pc:sldChg>
     </pc:docChg>
   </pc:docChgLst>
@@ -3847,6 +3028,825 @@
         <pc:sldMkLst>
           <pc:docMk/>
           <pc:sldMk cId="3025012799" sldId="267"/>
+        </pc:sldMkLst>
+      </pc:sldChg>
+    </pc:docChg>
+  </pc:docChgLst>
+  <pc:docChgLst>
+    <pc:chgData name="#LOR WEN SIN#" userId="f0d13d38-c6da-4a13-bbd5-986d82422d78" providerId="ADAL" clId="{3D8A7C46-7ADD-4EC1-9C73-A67BF3B1AE74}"/>
+    <pc:docChg chg="undo custSel addSld modSld sldOrd">
+      <pc:chgData name="#LOR WEN SIN#" userId="f0d13d38-c6da-4a13-bbd5-986d82422d78" providerId="ADAL" clId="{3D8A7C46-7ADD-4EC1-9C73-A67BF3B1AE74}" dt="2022-12-12T07:37:47.071" v="935" actId="14100"/>
+      <pc:docMkLst>
+        <pc:docMk/>
+      </pc:docMkLst>
+      <pc:sldChg chg="modSp">
+        <pc:chgData name="#LOR WEN SIN#" userId="f0d13d38-c6da-4a13-bbd5-986d82422d78" providerId="ADAL" clId="{3D8A7C46-7ADD-4EC1-9C73-A67BF3B1AE74}" dt="2022-12-06T16:38:02.705" v="934" actId="20577"/>
+        <pc:sldMkLst>
+          <pc:docMk/>
+          <pc:sldMk cId="282300819" sldId="257"/>
+        </pc:sldMkLst>
+        <pc:spChg chg="mod">
+          <ac:chgData name="#LOR WEN SIN#" userId="f0d13d38-c6da-4a13-bbd5-986d82422d78" providerId="ADAL" clId="{3D8A7C46-7ADD-4EC1-9C73-A67BF3B1AE74}" dt="2022-12-06T16:38:02.705" v="934" actId="20577"/>
+          <ac:spMkLst>
+            <pc:docMk/>
+            <pc:sldMk cId="282300819" sldId="257"/>
+            <ac:spMk id="2" creationId="{24819CFA-06A7-F042-47D1-18EFB2ACB2CA}"/>
+          </ac:spMkLst>
+        </pc:spChg>
+      </pc:sldChg>
+      <pc:sldChg chg="modSp mod">
+        <pc:chgData name="#LOR WEN SIN#" userId="f0d13d38-c6da-4a13-bbd5-986d82422d78" providerId="ADAL" clId="{3D8A7C46-7ADD-4EC1-9C73-A67BF3B1AE74}" dt="2022-12-12T07:37:47.071" v="935" actId="14100"/>
+        <pc:sldMkLst>
+          <pc:docMk/>
+          <pc:sldMk cId="562134134" sldId="261"/>
+        </pc:sldMkLst>
+        <pc:cxnChg chg="mod">
+          <ac:chgData name="#LOR WEN SIN#" userId="f0d13d38-c6da-4a13-bbd5-986d82422d78" providerId="ADAL" clId="{3D8A7C46-7ADD-4EC1-9C73-A67BF3B1AE74}" dt="2022-12-12T07:37:47.071" v="935" actId="14100"/>
+          <ac:cxnSpMkLst>
+            <pc:docMk/>
+            <pc:sldMk cId="562134134" sldId="261"/>
+            <ac:cxnSpMk id="33" creationId="{9A8BD10C-F05E-0492-8F4C-8160B58A9A0C}"/>
+          </ac:cxnSpMkLst>
+        </pc:cxnChg>
+      </pc:sldChg>
+      <pc:sldChg chg="modSp mod">
+        <pc:chgData name="#LOR WEN SIN#" userId="f0d13d38-c6da-4a13-bbd5-986d82422d78" providerId="ADAL" clId="{3D8A7C46-7ADD-4EC1-9C73-A67BF3B1AE74}" dt="2022-12-02T03:34:35.381" v="906" actId="20577"/>
+        <pc:sldMkLst>
+          <pc:docMk/>
+          <pc:sldMk cId="2699799663" sldId="269"/>
+        </pc:sldMkLst>
+        <pc:spChg chg="mod">
+          <ac:chgData name="#LOR WEN SIN#" userId="f0d13d38-c6da-4a13-bbd5-986d82422d78" providerId="ADAL" clId="{3D8A7C46-7ADD-4EC1-9C73-A67BF3B1AE74}" dt="2022-12-02T03:34:35.381" v="906" actId="20577"/>
+          <ac:spMkLst>
+            <pc:docMk/>
+            <pc:sldMk cId="2699799663" sldId="269"/>
+            <ac:spMk id="6" creationId="{5CD50B1F-CE0D-FED6-70A2-576A7E6C8A86}"/>
+          </ac:spMkLst>
+        </pc:spChg>
+      </pc:sldChg>
+      <pc:sldChg chg="addSp delSp modSp mod">
+        <pc:chgData name="#LOR WEN SIN#" userId="f0d13d38-c6da-4a13-bbd5-986d82422d78" providerId="ADAL" clId="{3D8A7C46-7ADD-4EC1-9C73-A67BF3B1AE74}" dt="2022-12-01T18:41:27.233" v="8" actId="21"/>
+        <pc:sldMkLst>
+          <pc:docMk/>
+          <pc:sldMk cId="2845790074" sldId="273"/>
+        </pc:sldMkLst>
+        <pc:spChg chg="add del mod">
+          <ac:chgData name="#LOR WEN SIN#" userId="f0d13d38-c6da-4a13-bbd5-986d82422d78" providerId="ADAL" clId="{3D8A7C46-7ADD-4EC1-9C73-A67BF3B1AE74}" dt="2022-12-01T18:41:27.233" v="8" actId="21"/>
+          <ac:spMkLst>
+            <pc:docMk/>
+            <pc:sldMk cId="2845790074" sldId="273"/>
+            <ac:spMk id="5" creationId="{F2D2999C-647C-F479-5E91-2FE27298B98B}"/>
+          </ac:spMkLst>
+        </pc:spChg>
+        <pc:picChg chg="del mod">
+          <ac:chgData name="#LOR WEN SIN#" userId="f0d13d38-c6da-4a13-bbd5-986d82422d78" providerId="ADAL" clId="{3D8A7C46-7ADD-4EC1-9C73-A67BF3B1AE74}" dt="2022-12-01T18:41:02.798" v="3" actId="478"/>
+          <ac:picMkLst>
+            <pc:docMk/>
+            <pc:sldMk cId="2845790074" sldId="273"/>
+            <ac:picMk id="41" creationId="{D4809756-D938-E287-68E7-52A4F7FF5B68}"/>
+          </ac:picMkLst>
+        </pc:picChg>
+      </pc:sldChg>
+      <pc:sldChg chg="addSp delSp modSp add mod">
+        <pc:chgData name="#LOR WEN SIN#" userId="f0d13d38-c6da-4a13-bbd5-986d82422d78" providerId="ADAL" clId="{3D8A7C46-7ADD-4EC1-9C73-A67BF3B1AE74}" dt="2022-12-01T18:47:24.274" v="223" actId="478"/>
+        <pc:sldMkLst>
+          <pc:docMk/>
+          <pc:sldMk cId="2733225216" sldId="274"/>
+        </pc:sldMkLst>
+        <pc:spChg chg="add mod">
+          <ac:chgData name="#LOR WEN SIN#" userId="f0d13d38-c6da-4a13-bbd5-986d82422d78" providerId="ADAL" clId="{3D8A7C46-7ADD-4EC1-9C73-A67BF3B1AE74}" dt="2022-12-01T18:41:29.049" v="9"/>
+          <ac:spMkLst>
+            <pc:docMk/>
+            <pc:sldMk cId="2733225216" sldId="274"/>
+            <ac:spMk id="5" creationId="{02F7AD3E-565F-2A15-8B40-B551C6FC47DE}"/>
+          </ac:spMkLst>
+        </pc:spChg>
+        <pc:picChg chg="del">
+          <ac:chgData name="#LOR WEN SIN#" userId="f0d13d38-c6da-4a13-bbd5-986d82422d78" providerId="ADAL" clId="{3D8A7C46-7ADD-4EC1-9C73-A67BF3B1AE74}" dt="2022-12-01T18:47:24.274" v="223" actId="478"/>
+          <ac:picMkLst>
+            <pc:docMk/>
+            <pc:sldMk cId="2733225216" sldId="274"/>
+            <ac:picMk id="41" creationId="{D4809756-D938-E287-68E7-52A4F7FF5B68}"/>
+          </ac:picMkLst>
+        </pc:picChg>
+      </pc:sldChg>
+      <pc:sldChg chg="addSp modSp add mod ord">
+        <pc:chgData name="#LOR WEN SIN#" userId="f0d13d38-c6da-4a13-bbd5-986d82422d78" providerId="ADAL" clId="{3D8A7C46-7ADD-4EC1-9C73-A67BF3B1AE74}" dt="2022-12-01T18:47:42.085" v="225" actId="1076"/>
+        <pc:sldMkLst>
+          <pc:docMk/>
+          <pc:sldMk cId="3490473200" sldId="275"/>
+        </pc:sldMkLst>
+        <pc:spChg chg="add mod">
+          <ac:chgData name="#LOR WEN SIN#" userId="f0d13d38-c6da-4a13-bbd5-986d82422d78" providerId="ADAL" clId="{3D8A7C46-7ADD-4EC1-9C73-A67BF3B1AE74}" dt="2022-12-01T18:47:42.085" v="225" actId="1076"/>
+          <ac:spMkLst>
+            <pc:docMk/>
+            <pc:sldMk cId="3490473200" sldId="275"/>
+            <ac:spMk id="5" creationId="{835114DF-08F6-34B8-CB4B-48FB882CDB9E}"/>
+          </ac:spMkLst>
+        </pc:spChg>
+      </pc:sldChg>
+      <pc:sldChg chg="addSp delSp modSp add mod">
+        <pc:chgData name="#LOR WEN SIN#" userId="f0d13d38-c6da-4a13-bbd5-986d82422d78" providerId="ADAL" clId="{3D8A7C46-7ADD-4EC1-9C73-A67BF3B1AE74}" dt="2022-12-01T18:46:06.405" v="138" actId="1076"/>
+        <pc:sldMkLst>
+          <pc:docMk/>
+          <pc:sldMk cId="2904309918" sldId="276"/>
+        </pc:sldMkLst>
+        <pc:spChg chg="del">
+          <ac:chgData name="#LOR WEN SIN#" userId="f0d13d38-c6da-4a13-bbd5-986d82422d78" providerId="ADAL" clId="{3D8A7C46-7ADD-4EC1-9C73-A67BF3B1AE74}" dt="2022-12-01T18:42:42.986" v="20" actId="478"/>
+          <ac:spMkLst>
+            <pc:docMk/>
+            <pc:sldMk cId="2904309918" sldId="276"/>
+            <ac:spMk id="3" creationId="{58241D10-3CEB-9D8A-00D7-3ACBECE79EAC}"/>
+          </ac:spMkLst>
+        </pc:spChg>
+        <pc:spChg chg="del">
+          <ac:chgData name="#LOR WEN SIN#" userId="f0d13d38-c6da-4a13-bbd5-986d82422d78" providerId="ADAL" clId="{3D8A7C46-7ADD-4EC1-9C73-A67BF3B1AE74}" dt="2022-12-01T18:42:37.258" v="18" actId="478"/>
+          <ac:spMkLst>
+            <pc:docMk/>
+            <pc:sldMk cId="2904309918" sldId="276"/>
+            <ac:spMk id="4" creationId="{959FAC9C-7D46-1EE4-BEBF-74D56D07856C}"/>
+          </ac:spMkLst>
+        </pc:spChg>
+        <pc:spChg chg="del">
+          <ac:chgData name="#LOR WEN SIN#" userId="f0d13d38-c6da-4a13-bbd5-986d82422d78" providerId="ADAL" clId="{3D8A7C46-7ADD-4EC1-9C73-A67BF3B1AE74}" dt="2022-12-01T18:41:59.657" v="14" actId="478"/>
+          <ac:spMkLst>
+            <pc:docMk/>
+            <pc:sldMk cId="2904309918" sldId="276"/>
+            <ac:spMk id="5" creationId="{02F7AD3E-565F-2A15-8B40-B551C6FC47DE}"/>
+          </ac:spMkLst>
+        </pc:spChg>
+        <pc:spChg chg="del">
+          <ac:chgData name="#LOR WEN SIN#" userId="f0d13d38-c6da-4a13-bbd5-986d82422d78" providerId="ADAL" clId="{3D8A7C46-7ADD-4EC1-9C73-A67BF3B1AE74}" dt="2022-12-01T18:42:42.986" v="20" actId="478"/>
+          <ac:spMkLst>
+            <pc:docMk/>
+            <pc:sldMk cId="2904309918" sldId="276"/>
+            <ac:spMk id="6" creationId="{54B11454-208D-E89A-0CD3-181FFB8D497A}"/>
+          </ac:spMkLst>
+        </pc:spChg>
+        <pc:spChg chg="del">
+          <ac:chgData name="#LOR WEN SIN#" userId="f0d13d38-c6da-4a13-bbd5-986d82422d78" providerId="ADAL" clId="{3D8A7C46-7ADD-4EC1-9C73-A67BF3B1AE74}" dt="2022-12-01T18:42:42.986" v="20" actId="478"/>
+          <ac:spMkLst>
+            <pc:docMk/>
+            <pc:sldMk cId="2904309918" sldId="276"/>
+            <ac:spMk id="8" creationId="{A16B15A9-8382-DAC4-0607-D404C98DF360}"/>
+          </ac:spMkLst>
+        </pc:spChg>
+        <pc:spChg chg="del">
+          <ac:chgData name="#LOR WEN SIN#" userId="f0d13d38-c6da-4a13-bbd5-986d82422d78" providerId="ADAL" clId="{3D8A7C46-7ADD-4EC1-9C73-A67BF3B1AE74}" dt="2022-12-01T18:42:42.986" v="20" actId="478"/>
+          <ac:spMkLst>
+            <pc:docMk/>
+            <pc:sldMk cId="2904309918" sldId="276"/>
+            <ac:spMk id="9" creationId="{1C703B8F-0653-B2E8-59F0-20932D084F72}"/>
+          </ac:spMkLst>
+        </pc:spChg>
+        <pc:spChg chg="del">
+          <ac:chgData name="#LOR WEN SIN#" userId="f0d13d38-c6da-4a13-bbd5-986d82422d78" providerId="ADAL" clId="{3D8A7C46-7ADD-4EC1-9C73-A67BF3B1AE74}" dt="2022-12-01T18:42:42.986" v="20" actId="478"/>
+          <ac:spMkLst>
+            <pc:docMk/>
+            <pc:sldMk cId="2904309918" sldId="276"/>
+            <ac:spMk id="10" creationId="{4B434B18-E85A-CC9F-65C7-23FFC7658A7C}"/>
+          </ac:spMkLst>
+        </pc:spChg>
+        <pc:spChg chg="del">
+          <ac:chgData name="#LOR WEN SIN#" userId="f0d13d38-c6da-4a13-bbd5-986d82422d78" providerId="ADAL" clId="{3D8A7C46-7ADD-4EC1-9C73-A67BF3B1AE74}" dt="2022-12-01T18:42:42.986" v="20" actId="478"/>
+          <ac:spMkLst>
+            <pc:docMk/>
+            <pc:sldMk cId="2904309918" sldId="276"/>
+            <ac:spMk id="11" creationId="{88009704-C336-9296-002D-2C6C0AAE5CD3}"/>
+          </ac:spMkLst>
+        </pc:spChg>
+        <pc:spChg chg="del">
+          <ac:chgData name="#LOR WEN SIN#" userId="f0d13d38-c6da-4a13-bbd5-986d82422d78" providerId="ADAL" clId="{3D8A7C46-7ADD-4EC1-9C73-A67BF3B1AE74}" dt="2022-12-01T18:42:48.135" v="22" actId="478"/>
+          <ac:spMkLst>
+            <pc:docMk/>
+            <pc:sldMk cId="2904309918" sldId="276"/>
+            <ac:spMk id="12" creationId="{8FE403C6-3DCC-91D4-0415-57254A370953}"/>
+          </ac:spMkLst>
+        </pc:spChg>
+        <pc:spChg chg="del">
+          <ac:chgData name="#LOR WEN SIN#" userId="f0d13d38-c6da-4a13-bbd5-986d82422d78" providerId="ADAL" clId="{3D8A7C46-7ADD-4EC1-9C73-A67BF3B1AE74}" dt="2022-12-01T18:42:48.135" v="22" actId="478"/>
+          <ac:spMkLst>
+            <pc:docMk/>
+            <pc:sldMk cId="2904309918" sldId="276"/>
+            <ac:spMk id="13" creationId="{CE733448-A6B6-7ACA-634F-487EB9D86A8E}"/>
+          </ac:spMkLst>
+        </pc:spChg>
+        <pc:spChg chg="add mod">
+          <ac:chgData name="#LOR WEN SIN#" userId="f0d13d38-c6da-4a13-bbd5-986d82422d78" providerId="ADAL" clId="{3D8A7C46-7ADD-4EC1-9C73-A67BF3B1AE74}" dt="2022-12-01T18:46:06.405" v="138" actId="1076"/>
+          <ac:spMkLst>
+            <pc:docMk/>
+            <pc:sldMk cId="2904309918" sldId="276"/>
+            <ac:spMk id="16" creationId="{DCFF677F-C49F-5A1A-BEC0-E4B34FB18AA7}"/>
+          </ac:spMkLst>
+        </pc:spChg>
+        <pc:spChg chg="del">
+          <ac:chgData name="#LOR WEN SIN#" userId="f0d13d38-c6da-4a13-bbd5-986d82422d78" providerId="ADAL" clId="{3D8A7C46-7ADD-4EC1-9C73-A67BF3B1AE74}" dt="2022-12-01T18:42:42.986" v="20" actId="478"/>
+          <ac:spMkLst>
+            <pc:docMk/>
+            <pc:sldMk cId="2904309918" sldId="276"/>
+            <ac:spMk id="19" creationId="{27339037-960E-82ED-8477-8653E8AEC4FB}"/>
+          </ac:spMkLst>
+        </pc:spChg>
+        <pc:spChg chg="del">
+          <ac:chgData name="#LOR WEN SIN#" userId="f0d13d38-c6da-4a13-bbd5-986d82422d78" providerId="ADAL" clId="{3D8A7C46-7ADD-4EC1-9C73-A67BF3B1AE74}" dt="2022-12-01T18:42:42.986" v="20" actId="478"/>
+          <ac:spMkLst>
+            <pc:docMk/>
+            <pc:sldMk cId="2904309918" sldId="276"/>
+            <ac:spMk id="20" creationId="{970C2948-C03E-05CC-FF84-2D259DF201E8}"/>
+          </ac:spMkLst>
+        </pc:spChg>
+        <pc:spChg chg="del">
+          <ac:chgData name="#LOR WEN SIN#" userId="f0d13d38-c6da-4a13-bbd5-986d82422d78" providerId="ADAL" clId="{3D8A7C46-7ADD-4EC1-9C73-A67BF3B1AE74}" dt="2022-12-01T18:42:42.986" v="20" actId="478"/>
+          <ac:spMkLst>
+            <pc:docMk/>
+            <pc:sldMk cId="2904309918" sldId="276"/>
+            <ac:spMk id="28" creationId="{5E7ACF6D-F4B4-EE93-25B3-C4EF0941D6F0}"/>
+          </ac:spMkLst>
+        </pc:spChg>
+        <pc:spChg chg="del">
+          <ac:chgData name="#LOR WEN SIN#" userId="f0d13d38-c6da-4a13-bbd5-986d82422d78" providerId="ADAL" clId="{3D8A7C46-7ADD-4EC1-9C73-A67BF3B1AE74}" dt="2022-12-01T18:42:42.986" v="20" actId="478"/>
+          <ac:spMkLst>
+            <pc:docMk/>
+            <pc:sldMk cId="2904309918" sldId="276"/>
+            <ac:spMk id="29" creationId="{DB8D8628-4031-907D-A8DF-3BCA29F40652}"/>
+          </ac:spMkLst>
+        </pc:spChg>
+        <pc:spChg chg="del">
+          <ac:chgData name="#LOR WEN SIN#" userId="f0d13d38-c6da-4a13-bbd5-986d82422d78" providerId="ADAL" clId="{3D8A7C46-7ADD-4EC1-9C73-A67BF3B1AE74}" dt="2022-12-01T18:42:42.986" v="20" actId="478"/>
+          <ac:spMkLst>
+            <pc:docMk/>
+            <pc:sldMk cId="2904309918" sldId="276"/>
+            <ac:spMk id="30" creationId="{CF0759BC-A708-5F79-FE19-DC985D32A509}"/>
+          </ac:spMkLst>
+        </pc:spChg>
+        <pc:spChg chg="del">
+          <ac:chgData name="#LOR WEN SIN#" userId="f0d13d38-c6da-4a13-bbd5-986d82422d78" providerId="ADAL" clId="{3D8A7C46-7ADD-4EC1-9C73-A67BF3B1AE74}" dt="2022-12-01T18:42:42.986" v="20" actId="478"/>
+          <ac:spMkLst>
+            <pc:docMk/>
+            <pc:sldMk cId="2904309918" sldId="276"/>
+            <ac:spMk id="31" creationId="{36CE6A2F-2875-C624-14EC-B0ECF1F39479}"/>
+          </ac:spMkLst>
+        </pc:spChg>
+        <pc:spChg chg="del">
+          <ac:chgData name="#LOR WEN SIN#" userId="f0d13d38-c6da-4a13-bbd5-986d82422d78" providerId="ADAL" clId="{3D8A7C46-7ADD-4EC1-9C73-A67BF3B1AE74}" dt="2022-12-01T18:42:42.986" v="20" actId="478"/>
+          <ac:spMkLst>
+            <pc:docMk/>
+            <pc:sldMk cId="2904309918" sldId="276"/>
+            <ac:spMk id="32" creationId="{F7A68474-E72A-FC1C-D6D3-91C1F5EF442C}"/>
+          </ac:spMkLst>
+        </pc:spChg>
+        <pc:spChg chg="del">
+          <ac:chgData name="#LOR WEN SIN#" userId="f0d13d38-c6da-4a13-bbd5-986d82422d78" providerId="ADAL" clId="{3D8A7C46-7ADD-4EC1-9C73-A67BF3B1AE74}" dt="2022-12-01T18:42:42.986" v="20" actId="478"/>
+          <ac:spMkLst>
+            <pc:docMk/>
+            <pc:sldMk cId="2904309918" sldId="276"/>
+            <ac:spMk id="34" creationId="{721E1785-3B4A-852A-8E83-4DC46956B3C7}"/>
+          </ac:spMkLst>
+        </pc:spChg>
+        <pc:spChg chg="del">
+          <ac:chgData name="#LOR WEN SIN#" userId="f0d13d38-c6da-4a13-bbd5-986d82422d78" providerId="ADAL" clId="{3D8A7C46-7ADD-4EC1-9C73-A67BF3B1AE74}" dt="2022-12-01T18:42:44.364" v="21" actId="478"/>
+          <ac:spMkLst>
+            <pc:docMk/>
+            <pc:sldMk cId="2904309918" sldId="276"/>
+            <ac:spMk id="39" creationId="{5E05A5BE-FE40-9CC8-1CA1-9876AD090F74}"/>
+          </ac:spMkLst>
+        </pc:spChg>
+        <pc:spChg chg="del">
+          <ac:chgData name="#LOR WEN SIN#" userId="f0d13d38-c6da-4a13-bbd5-986d82422d78" providerId="ADAL" clId="{3D8A7C46-7ADD-4EC1-9C73-A67BF3B1AE74}" dt="2022-12-01T18:42:44.364" v="21" actId="478"/>
+          <ac:spMkLst>
+            <pc:docMk/>
+            <pc:sldMk cId="2904309918" sldId="276"/>
+            <ac:spMk id="40" creationId="{A45599DB-03D0-A0CC-C62F-4984F0C79353}"/>
+          </ac:spMkLst>
+        </pc:spChg>
+        <pc:spChg chg="del">
+          <ac:chgData name="#LOR WEN SIN#" userId="f0d13d38-c6da-4a13-bbd5-986d82422d78" providerId="ADAL" clId="{3D8A7C46-7ADD-4EC1-9C73-A67BF3B1AE74}" dt="2022-12-01T18:42:49.619" v="23" actId="478"/>
+          <ac:spMkLst>
+            <pc:docMk/>
+            <pc:sldMk cId="2904309918" sldId="276"/>
+            <ac:spMk id="129" creationId="{2DEDFE72-B4DF-2F04-A6D3-6A33D7C9A79C}"/>
+          </ac:spMkLst>
+        </pc:spChg>
+        <pc:picChg chg="add mod">
+          <ac:chgData name="#LOR WEN SIN#" userId="f0d13d38-c6da-4a13-bbd5-986d82422d78" providerId="ADAL" clId="{3D8A7C46-7ADD-4EC1-9C73-A67BF3B1AE74}" dt="2022-12-01T18:45:16.582" v="58" actId="1076"/>
+          <ac:picMkLst>
+            <pc:docMk/>
+            <pc:sldMk cId="2904309918" sldId="276"/>
+            <ac:picMk id="7" creationId="{416CD740-1907-C729-BAB1-186F8A4FE9A7}"/>
+          </ac:picMkLst>
+        </pc:picChg>
+        <pc:picChg chg="add mod">
+          <ac:chgData name="#LOR WEN SIN#" userId="f0d13d38-c6da-4a13-bbd5-986d82422d78" providerId="ADAL" clId="{3D8A7C46-7ADD-4EC1-9C73-A67BF3B1AE74}" dt="2022-12-01T18:45:14.279" v="57" actId="1076"/>
+          <ac:picMkLst>
+            <pc:docMk/>
+            <pc:sldMk cId="2904309918" sldId="276"/>
+            <ac:picMk id="14" creationId="{9E1059E8-8373-0149-F570-5B967300916B}"/>
+          </ac:picMkLst>
+        </pc:picChg>
+        <pc:picChg chg="del mod">
+          <ac:chgData name="#LOR WEN SIN#" userId="f0d13d38-c6da-4a13-bbd5-986d82422d78" providerId="ADAL" clId="{3D8A7C46-7ADD-4EC1-9C73-A67BF3B1AE74}" dt="2022-12-01T18:44:44.021" v="50" actId="478"/>
+          <ac:picMkLst>
+            <pc:docMk/>
+            <pc:sldMk cId="2904309918" sldId="276"/>
+            <ac:picMk id="41" creationId="{D4809756-D938-E287-68E7-52A4F7FF5B68}"/>
+          </ac:picMkLst>
+        </pc:picChg>
+        <pc:cxnChg chg="del mod">
+          <ac:chgData name="#LOR WEN SIN#" userId="f0d13d38-c6da-4a13-bbd5-986d82422d78" providerId="ADAL" clId="{3D8A7C46-7ADD-4EC1-9C73-A67BF3B1AE74}" dt="2022-12-01T18:42:42.986" v="20" actId="478"/>
+          <ac:cxnSpMkLst>
+            <pc:docMk/>
+            <pc:sldMk cId="2904309918" sldId="276"/>
+            <ac:cxnSpMk id="15" creationId="{217CDEA4-5302-AF91-4EBD-EBAD4367F43E}"/>
+          </ac:cxnSpMkLst>
+        </pc:cxnChg>
+        <pc:cxnChg chg="del">
+          <ac:chgData name="#LOR WEN SIN#" userId="f0d13d38-c6da-4a13-bbd5-986d82422d78" providerId="ADAL" clId="{3D8A7C46-7ADD-4EC1-9C73-A67BF3B1AE74}" dt="2022-12-01T18:42:42.986" v="20" actId="478"/>
+          <ac:cxnSpMkLst>
+            <pc:docMk/>
+            <pc:sldMk cId="2904309918" sldId="276"/>
+            <ac:cxnSpMk id="18" creationId="{EAC29ECF-B420-D62D-3A27-C76D12AA2551}"/>
+          </ac:cxnSpMkLst>
+        </pc:cxnChg>
+        <pc:cxnChg chg="del mod">
+          <ac:chgData name="#LOR WEN SIN#" userId="f0d13d38-c6da-4a13-bbd5-986d82422d78" providerId="ADAL" clId="{3D8A7C46-7ADD-4EC1-9C73-A67BF3B1AE74}" dt="2022-12-01T18:42:42.986" v="20" actId="478"/>
+          <ac:cxnSpMkLst>
+            <pc:docMk/>
+            <pc:sldMk cId="2904309918" sldId="276"/>
+            <ac:cxnSpMk id="22" creationId="{83B951B0-5262-80C9-7672-25071FC507EE}"/>
+          </ac:cxnSpMkLst>
+        </pc:cxnChg>
+        <pc:cxnChg chg="del mod">
+          <ac:chgData name="#LOR WEN SIN#" userId="f0d13d38-c6da-4a13-bbd5-986d82422d78" providerId="ADAL" clId="{3D8A7C46-7ADD-4EC1-9C73-A67BF3B1AE74}" dt="2022-12-01T18:42:42.986" v="20" actId="478"/>
+          <ac:cxnSpMkLst>
+            <pc:docMk/>
+            <pc:sldMk cId="2904309918" sldId="276"/>
+            <ac:cxnSpMk id="24" creationId="{8B2E73C1-C026-9C9B-5C3D-035905B86AE4}"/>
+          </ac:cxnSpMkLst>
+        </pc:cxnChg>
+        <pc:cxnChg chg="del">
+          <ac:chgData name="#LOR WEN SIN#" userId="f0d13d38-c6da-4a13-bbd5-986d82422d78" providerId="ADAL" clId="{3D8A7C46-7ADD-4EC1-9C73-A67BF3B1AE74}" dt="2022-12-01T18:42:42.986" v="20" actId="478"/>
+          <ac:cxnSpMkLst>
+            <pc:docMk/>
+            <pc:sldMk cId="2904309918" sldId="276"/>
+            <ac:cxnSpMk id="26" creationId="{4B0EFFA7-919C-ED98-69BB-0D3F78D3B421}"/>
+          </ac:cxnSpMkLst>
+        </pc:cxnChg>
+        <pc:cxnChg chg="del mod">
+          <ac:chgData name="#LOR WEN SIN#" userId="f0d13d38-c6da-4a13-bbd5-986d82422d78" providerId="ADAL" clId="{3D8A7C46-7ADD-4EC1-9C73-A67BF3B1AE74}" dt="2022-12-01T18:42:42.986" v="20" actId="478"/>
+          <ac:cxnSpMkLst>
+            <pc:docMk/>
+            <pc:sldMk cId="2904309918" sldId="276"/>
+            <ac:cxnSpMk id="38" creationId="{8BF6D69D-4F30-6A12-E99D-19F39C260112}"/>
+          </ac:cxnSpMkLst>
+        </pc:cxnChg>
+      </pc:sldChg>
+      <pc:sldChg chg="addSp delSp modSp add mod ord">
+        <pc:chgData name="#LOR WEN SIN#" userId="f0d13d38-c6da-4a13-bbd5-986d82422d78" providerId="ADAL" clId="{3D8A7C46-7ADD-4EC1-9C73-A67BF3B1AE74}" dt="2022-12-01T18:47:16.585" v="222" actId="1076"/>
+        <pc:sldMkLst>
+          <pc:docMk/>
+          <pc:sldMk cId="2132711477" sldId="277"/>
+        </pc:sldMkLst>
+        <pc:spChg chg="add mod">
+          <ac:chgData name="#LOR WEN SIN#" userId="f0d13d38-c6da-4a13-bbd5-986d82422d78" providerId="ADAL" clId="{3D8A7C46-7ADD-4EC1-9C73-A67BF3B1AE74}" dt="2022-12-01T18:47:16.585" v="222" actId="1076"/>
+          <ac:spMkLst>
+            <pc:docMk/>
+            <pc:sldMk cId="2132711477" sldId="277"/>
+            <ac:spMk id="3" creationId="{6903075D-904E-CB0D-57E5-9E06A3AC46FD}"/>
+          </ac:spMkLst>
+        </pc:spChg>
+        <pc:picChg chg="del">
+          <ac:chgData name="#LOR WEN SIN#" userId="f0d13d38-c6da-4a13-bbd5-986d82422d78" providerId="ADAL" clId="{3D8A7C46-7ADD-4EC1-9C73-A67BF3B1AE74}" dt="2022-12-01T18:44:19.409" v="42" actId="478"/>
+          <ac:picMkLst>
+            <pc:docMk/>
+            <pc:sldMk cId="2132711477" sldId="277"/>
+            <ac:picMk id="7" creationId="{416CD740-1907-C729-BAB1-186F8A4FE9A7}"/>
+          </ac:picMkLst>
+        </pc:picChg>
+        <pc:picChg chg="del">
+          <ac:chgData name="#LOR WEN SIN#" userId="f0d13d38-c6da-4a13-bbd5-986d82422d78" providerId="ADAL" clId="{3D8A7C46-7ADD-4EC1-9C73-A67BF3B1AE74}" dt="2022-12-01T18:44:19.868" v="43" actId="478"/>
+          <ac:picMkLst>
+            <pc:docMk/>
+            <pc:sldMk cId="2132711477" sldId="277"/>
+            <ac:picMk id="14" creationId="{9E1059E8-8373-0149-F570-5B967300916B}"/>
+          </ac:picMkLst>
+        </pc:picChg>
+        <pc:picChg chg="mod">
+          <ac:chgData name="#LOR WEN SIN#" userId="f0d13d38-c6da-4a13-bbd5-986d82422d78" providerId="ADAL" clId="{3D8A7C46-7ADD-4EC1-9C73-A67BF3B1AE74}" dt="2022-12-01T18:44:30.779" v="47" actId="1076"/>
+          <ac:picMkLst>
+            <pc:docMk/>
+            <pc:sldMk cId="2132711477" sldId="277"/>
+            <ac:picMk id="41" creationId="{D4809756-D938-E287-68E7-52A4F7FF5B68}"/>
+          </ac:picMkLst>
+        </pc:picChg>
+      </pc:sldChg>
+      <pc:sldChg chg="addSp delSp modSp add mod ord">
+        <pc:chgData name="#LOR WEN SIN#" userId="f0d13d38-c6da-4a13-bbd5-986d82422d78" providerId="ADAL" clId="{3D8A7C46-7ADD-4EC1-9C73-A67BF3B1AE74}" dt="2022-12-01T18:48:44.710" v="289" actId="1076"/>
+        <pc:sldMkLst>
+          <pc:docMk/>
+          <pc:sldMk cId="173527197" sldId="278"/>
+        </pc:sldMkLst>
+        <pc:spChg chg="add del mod">
+          <ac:chgData name="#LOR WEN SIN#" userId="f0d13d38-c6da-4a13-bbd5-986d82422d78" providerId="ADAL" clId="{3D8A7C46-7ADD-4EC1-9C73-A67BF3B1AE74}" dt="2022-12-01T18:48:39.273" v="287" actId="1076"/>
+          <ac:spMkLst>
+            <pc:docMk/>
+            <pc:sldMk cId="173527197" sldId="278"/>
+            <ac:spMk id="16" creationId="{DCFF677F-C49F-5A1A-BEC0-E4B34FB18AA7}"/>
+          </ac:spMkLst>
+        </pc:spChg>
+        <pc:picChg chg="add mod">
+          <ac:chgData name="#LOR WEN SIN#" userId="f0d13d38-c6da-4a13-bbd5-986d82422d78" providerId="ADAL" clId="{3D8A7C46-7ADD-4EC1-9C73-A67BF3B1AE74}" dt="2022-12-01T18:48:44.710" v="289" actId="1076"/>
+          <ac:picMkLst>
+            <pc:docMk/>
+            <pc:sldMk cId="173527197" sldId="278"/>
+            <ac:picMk id="3" creationId="{F3AAA99E-1C7F-0F2F-D9E3-52DF83820145}"/>
+          </ac:picMkLst>
+        </pc:picChg>
+        <pc:picChg chg="del">
+          <ac:chgData name="#LOR WEN SIN#" userId="f0d13d38-c6da-4a13-bbd5-986d82422d78" providerId="ADAL" clId="{3D8A7C46-7ADD-4EC1-9C73-A67BF3B1AE74}" dt="2022-12-01T18:47:50.774" v="229" actId="478"/>
+          <ac:picMkLst>
+            <pc:docMk/>
+            <pc:sldMk cId="173527197" sldId="278"/>
+            <ac:picMk id="7" creationId="{416CD740-1907-C729-BAB1-186F8A4FE9A7}"/>
+          </ac:picMkLst>
+        </pc:picChg>
+        <pc:picChg chg="del">
+          <ac:chgData name="#LOR WEN SIN#" userId="f0d13d38-c6da-4a13-bbd5-986d82422d78" providerId="ADAL" clId="{3D8A7C46-7ADD-4EC1-9C73-A67BF3B1AE74}" dt="2022-12-01T18:47:51.238" v="230" actId="478"/>
+          <ac:picMkLst>
+            <pc:docMk/>
+            <pc:sldMk cId="173527197" sldId="278"/>
+            <ac:picMk id="14" creationId="{9E1059E8-8373-0149-F570-5B967300916B}"/>
+          </ac:picMkLst>
+        </pc:picChg>
+      </pc:sldChg>
+      <pc:sldChg chg="modSp add mod ord">
+        <pc:chgData name="#LOR WEN SIN#" userId="f0d13d38-c6da-4a13-bbd5-986d82422d78" providerId="ADAL" clId="{3D8A7C46-7ADD-4EC1-9C73-A67BF3B1AE74}" dt="2022-12-01T18:49:19.076" v="293" actId="1076"/>
+        <pc:sldMkLst>
+          <pc:docMk/>
+          <pc:sldMk cId="2725808673" sldId="279"/>
+        </pc:sldMkLst>
+        <pc:spChg chg="mod">
+          <ac:chgData name="#LOR WEN SIN#" userId="f0d13d38-c6da-4a13-bbd5-986d82422d78" providerId="ADAL" clId="{3D8A7C46-7ADD-4EC1-9C73-A67BF3B1AE74}" dt="2022-12-01T18:49:19.076" v="293" actId="1076"/>
+          <ac:spMkLst>
+            <pc:docMk/>
+            <pc:sldMk cId="2725808673" sldId="279"/>
+            <ac:spMk id="5" creationId="{835114DF-08F6-34B8-CB4B-48FB882CDB9E}"/>
+          </ac:spMkLst>
+        </pc:spChg>
+      </pc:sldChg>
+      <pc:sldChg chg="addSp delSp modSp add mod ord">
+        <pc:chgData name="#LOR WEN SIN#" userId="f0d13d38-c6da-4a13-bbd5-986d82422d78" providerId="ADAL" clId="{3D8A7C46-7ADD-4EC1-9C73-A67BF3B1AE74}" dt="2022-12-01T18:54:57.275" v="451" actId="1036"/>
+        <pc:sldMkLst>
+          <pc:docMk/>
+          <pc:sldMk cId="2713900647" sldId="280"/>
+        </pc:sldMkLst>
+        <pc:spChg chg="mod">
+          <ac:chgData name="#LOR WEN SIN#" userId="f0d13d38-c6da-4a13-bbd5-986d82422d78" providerId="ADAL" clId="{3D8A7C46-7ADD-4EC1-9C73-A67BF3B1AE74}" dt="2022-12-01T18:50:09.219" v="302" actId="27636"/>
+          <ac:spMkLst>
+            <pc:docMk/>
+            <pc:sldMk cId="2713900647" sldId="280"/>
+            <ac:spMk id="2" creationId="{7A52E233-DA80-5A3A-534F-8A98B545F1D9}"/>
+          </ac:spMkLst>
+        </pc:spChg>
+        <pc:spChg chg="mod">
+          <ac:chgData name="#LOR WEN SIN#" userId="f0d13d38-c6da-4a13-bbd5-986d82422d78" providerId="ADAL" clId="{3D8A7C46-7ADD-4EC1-9C73-A67BF3B1AE74}" dt="2022-12-01T18:51:43.123" v="435" actId="14100"/>
+          <ac:spMkLst>
+            <pc:docMk/>
+            <pc:sldMk cId="2713900647" sldId="280"/>
+            <ac:spMk id="16" creationId="{DCFF677F-C49F-5A1A-BEC0-E4B34FB18AA7}"/>
+          </ac:spMkLst>
+        </pc:spChg>
+        <pc:picChg chg="del">
+          <ac:chgData name="#LOR WEN SIN#" userId="f0d13d38-c6da-4a13-bbd5-986d82422d78" providerId="ADAL" clId="{3D8A7C46-7ADD-4EC1-9C73-A67BF3B1AE74}" dt="2022-12-01T18:49:55.705" v="297" actId="478"/>
+          <ac:picMkLst>
+            <pc:docMk/>
+            <pc:sldMk cId="2713900647" sldId="280"/>
+            <ac:picMk id="3" creationId="{F3AAA99E-1C7F-0F2F-D9E3-52DF83820145}"/>
+          </ac:picMkLst>
+        </pc:picChg>
+        <pc:picChg chg="add mod">
+          <ac:chgData name="#LOR WEN SIN#" userId="f0d13d38-c6da-4a13-bbd5-986d82422d78" providerId="ADAL" clId="{3D8A7C46-7ADD-4EC1-9C73-A67BF3B1AE74}" dt="2022-12-01T18:54:57.275" v="451" actId="1036"/>
+          <ac:picMkLst>
+            <pc:docMk/>
+            <pc:sldMk cId="2713900647" sldId="280"/>
+            <ac:picMk id="4" creationId="{062730DC-AD33-E744-A459-0214A113117B}"/>
+          </ac:picMkLst>
+        </pc:picChg>
+      </pc:sldChg>
+      <pc:sldChg chg="modSp add mod ord">
+        <pc:chgData name="#LOR WEN SIN#" userId="f0d13d38-c6da-4a13-bbd5-986d82422d78" providerId="ADAL" clId="{3D8A7C46-7ADD-4EC1-9C73-A67BF3B1AE74}" dt="2022-12-01T18:52:18.598" v="441" actId="1076"/>
+        <pc:sldMkLst>
+          <pc:docMk/>
+          <pc:sldMk cId="148900624" sldId="281"/>
+        </pc:sldMkLst>
+        <pc:spChg chg="mod">
+          <ac:chgData name="#LOR WEN SIN#" userId="f0d13d38-c6da-4a13-bbd5-986d82422d78" providerId="ADAL" clId="{3D8A7C46-7ADD-4EC1-9C73-A67BF3B1AE74}" dt="2022-12-01T18:52:18.598" v="441" actId="1076"/>
+          <ac:spMkLst>
+            <pc:docMk/>
+            <pc:sldMk cId="148900624" sldId="281"/>
+            <ac:spMk id="5" creationId="{835114DF-08F6-34B8-CB4B-48FB882CDB9E}"/>
+          </ac:spMkLst>
+        </pc:spChg>
+      </pc:sldChg>
+      <pc:sldChg chg="addSp delSp modSp add mod ord">
+        <pc:chgData name="#LOR WEN SIN#" userId="f0d13d38-c6da-4a13-bbd5-986d82422d78" providerId="ADAL" clId="{3D8A7C46-7ADD-4EC1-9C73-A67BF3B1AE74}" dt="2022-12-01T19:16:48.460" v="806" actId="14100"/>
+        <pc:sldMkLst>
+          <pc:docMk/>
+          <pc:sldMk cId="190251951" sldId="282"/>
+        </pc:sldMkLst>
+        <pc:spChg chg="add mod">
+          <ac:chgData name="#LOR WEN SIN#" userId="f0d13d38-c6da-4a13-bbd5-986d82422d78" providerId="ADAL" clId="{3D8A7C46-7ADD-4EC1-9C73-A67BF3B1AE74}" dt="2022-12-01T19:05:26.658" v="474" actId="14100"/>
+          <ac:spMkLst>
+            <pc:docMk/>
+            <pc:sldMk cId="190251951" sldId="282"/>
+            <ac:spMk id="10" creationId="{1E6A8503-9B42-4125-B3E1-0F2E44E6D342}"/>
+          </ac:spMkLst>
+        </pc:spChg>
+        <pc:spChg chg="add del mod">
+          <ac:chgData name="#LOR WEN SIN#" userId="f0d13d38-c6da-4a13-bbd5-986d82422d78" providerId="ADAL" clId="{3D8A7C46-7ADD-4EC1-9C73-A67BF3B1AE74}" dt="2022-12-01T19:08:48.477" v="479" actId="478"/>
+          <ac:spMkLst>
+            <pc:docMk/>
+            <pc:sldMk cId="190251951" sldId="282"/>
+            <ac:spMk id="11" creationId="{7F5C0684-28A7-9D8B-D7C0-E8EECCEA9CF2}"/>
+          </ac:spMkLst>
+        </pc:spChg>
+        <pc:spChg chg="add mod">
+          <ac:chgData name="#LOR WEN SIN#" userId="f0d13d38-c6da-4a13-bbd5-986d82422d78" providerId="ADAL" clId="{3D8A7C46-7ADD-4EC1-9C73-A67BF3B1AE74}" dt="2022-12-01T19:09:33.671" v="481" actId="1076"/>
+          <ac:spMkLst>
+            <pc:docMk/>
+            <pc:sldMk cId="190251951" sldId="282"/>
+            <ac:spMk id="13" creationId="{A1AA63EC-8105-27A0-ABAE-81B7136EB96A}"/>
+          </ac:spMkLst>
+        </pc:spChg>
+        <pc:spChg chg="add mod">
+          <ac:chgData name="#LOR WEN SIN#" userId="f0d13d38-c6da-4a13-bbd5-986d82422d78" providerId="ADAL" clId="{3D8A7C46-7ADD-4EC1-9C73-A67BF3B1AE74}" dt="2022-12-01T19:09:38.974" v="483" actId="1076"/>
+          <ac:spMkLst>
+            <pc:docMk/>
+            <pc:sldMk cId="190251951" sldId="282"/>
+            <ac:spMk id="14" creationId="{49DCD358-50B1-79A8-2593-AFA1BD32BB67}"/>
+          </ac:spMkLst>
+        </pc:spChg>
+        <pc:spChg chg="add mod">
+          <ac:chgData name="#LOR WEN SIN#" userId="f0d13d38-c6da-4a13-bbd5-986d82422d78" providerId="ADAL" clId="{3D8A7C46-7ADD-4EC1-9C73-A67BF3B1AE74}" dt="2022-12-01T19:09:51.236" v="485" actId="1076"/>
+          <ac:spMkLst>
+            <pc:docMk/>
+            <pc:sldMk cId="190251951" sldId="282"/>
+            <ac:spMk id="15" creationId="{1E324E68-E22F-CFA4-00DC-2CDCE8AC73EB}"/>
+          </ac:spMkLst>
+        </pc:spChg>
+        <pc:spChg chg="del">
+          <ac:chgData name="#LOR WEN SIN#" userId="f0d13d38-c6da-4a13-bbd5-986d82422d78" providerId="ADAL" clId="{3D8A7C46-7ADD-4EC1-9C73-A67BF3B1AE74}" dt="2022-12-01T18:52:33.672" v="446" actId="478"/>
+          <ac:spMkLst>
+            <pc:docMk/>
+            <pc:sldMk cId="190251951" sldId="282"/>
+            <ac:spMk id="16" creationId="{DCFF677F-C49F-5A1A-BEC0-E4B34FB18AA7}"/>
+          </ac:spMkLst>
+        </pc:spChg>
+        <pc:spChg chg="add mod">
+          <ac:chgData name="#LOR WEN SIN#" userId="f0d13d38-c6da-4a13-bbd5-986d82422d78" providerId="ADAL" clId="{3D8A7C46-7ADD-4EC1-9C73-A67BF3B1AE74}" dt="2022-12-01T19:09:55.030" v="487" actId="1076"/>
+          <ac:spMkLst>
+            <pc:docMk/>
+            <pc:sldMk cId="190251951" sldId="282"/>
+            <ac:spMk id="17" creationId="{56B49E62-FD90-3624-ED68-C3171E6B5472}"/>
+          </ac:spMkLst>
+        </pc:spChg>
+        <pc:spChg chg="add mod">
+          <ac:chgData name="#LOR WEN SIN#" userId="f0d13d38-c6da-4a13-bbd5-986d82422d78" providerId="ADAL" clId="{3D8A7C46-7ADD-4EC1-9C73-A67BF3B1AE74}" dt="2022-12-01T19:09:58.271" v="489" actId="1076"/>
+          <ac:spMkLst>
+            <pc:docMk/>
+            <pc:sldMk cId="190251951" sldId="282"/>
+            <ac:spMk id="18" creationId="{6CA87DC2-61AD-2986-54AA-17690D1F8798}"/>
+          </ac:spMkLst>
+        </pc:spChg>
+        <pc:spChg chg="add mod">
+          <ac:chgData name="#LOR WEN SIN#" userId="f0d13d38-c6da-4a13-bbd5-986d82422d78" providerId="ADAL" clId="{3D8A7C46-7ADD-4EC1-9C73-A67BF3B1AE74}" dt="2022-12-01T19:10:30.565" v="505" actId="1076"/>
+          <ac:spMkLst>
+            <pc:docMk/>
+            <pc:sldMk cId="190251951" sldId="282"/>
+            <ac:spMk id="20" creationId="{FF8B8A38-06D4-C0C8-CB60-6D42D4099B8B}"/>
+          </ac:spMkLst>
+        </pc:spChg>
+        <pc:spChg chg="add mod">
+          <ac:chgData name="#LOR WEN SIN#" userId="f0d13d38-c6da-4a13-bbd5-986d82422d78" providerId="ADAL" clId="{3D8A7C46-7ADD-4EC1-9C73-A67BF3B1AE74}" dt="2022-12-01T19:10:44.726" v="512" actId="1076"/>
+          <ac:spMkLst>
+            <pc:docMk/>
+            <pc:sldMk cId="190251951" sldId="282"/>
+            <ac:spMk id="21" creationId="{0F34583B-436D-086B-0CC2-7044E8F65C89}"/>
+          </ac:spMkLst>
+        </pc:spChg>
+        <pc:spChg chg="add mod">
+          <ac:chgData name="#LOR WEN SIN#" userId="f0d13d38-c6da-4a13-bbd5-986d82422d78" providerId="ADAL" clId="{3D8A7C46-7ADD-4EC1-9C73-A67BF3B1AE74}" dt="2022-12-01T19:10:52.074" v="516" actId="20577"/>
+          <ac:spMkLst>
+            <pc:docMk/>
+            <pc:sldMk cId="190251951" sldId="282"/>
+            <ac:spMk id="22" creationId="{9CBC419B-3D9C-C947-B5CC-57AB70971094}"/>
+          </ac:spMkLst>
+        </pc:spChg>
+        <pc:spChg chg="add mod">
+          <ac:chgData name="#LOR WEN SIN#" userId="f0d13d38-c6da-4a13-bbd5-986d82422d78" providerId="ADAL" clId="{3D8A7C46-7ADD-4EC1-9C73-A67BF3B1AE74}" dt="2022-12-01T19:11:53.898" v="525" actId="20577"/>
+          <ac:spMkLst>
+            <pc:docMk/>
+            <pc:sldMk cId="190251951" sldId="282"/>
+            <ac:spMk id="26" creationId="{C62B91F9-3A45-AE70-10FE-29DD4D9760E1}"/>
+          </ac:spMkLst>
+        </pc:spChg>
+        <pc:spChg chg="add mod">
+          <ac:chgData name="#LOR WEN SIN#" userId="f0d13d38-c6da-4a13-bbd5-986d82422d78" providerId="ADAL" clId="{3D8A7C46-7ADD-4EC1-9C73-A67BF3B1AE74}" dt="2022-12-01T19:12:16.466" v="533" actId="1076"/>
+          <ac:spMkLst>
+            <pc:docMk/>
+            <pc:sldMk cId="190251951" sldId="282"/>
+            <ac:spMk id="27" creationId="{041B9BF4-BFA7-FC69-A198-837242CB2AAF}"/>
+          </ac:spMkLst>
+        </pc:spChg>
+        <pc:spChg chg="add mod">
+          <ac:chgData name="#LOR WEN SIN#" userId="f0d13d38-c6da-4a13-bbd5-986d82422d78" providerId="ADAL" clId="{3D8A7C46-7ADD-4EC1-9C73-A67BF3B1AE74}" dt="2022-12-01T19:12:47.029" v="538" actId="207"/>
+          <ac:spMkLst>
+            <pc:docMk/>
+            <pc:sldMk cId="190251951" sldId="282"/>
+            <ac:spMk id="30" creationId="{7AB09CB1-9DE0-7FC1-B0F7-329CDE89201B}"/>
+          </ac:spMkLst>
+        </pc:spChg>
+        <pc:spChg chg="add mod">
+          <ac:chgData name="#LOR WEN SIN#" userId="f0d13d38-c6da-4a13-bbd5-986d82422d78" providerId="ADAL" clId="{3D8A7C46-7ADD-4EC1-9C73-A67BF3B1AE74}" dt="2022-12-01T19:12:41.473" v="537" actId="207"/>
+          <ac:spMkLst>
+            <pc:docMk/>
+            <pc:sldMk cId="190251951" sldId="282"/>
+            <ac:spMk id="31" creationId="{19FCEC16-8BE9-76E1-6ED3-CCA56742F3B4}"/>
+          </ac:spMkLst>
+        </pc:spChg>
+        <pc:spChg chg="add mod">
+          <ac:chgData name="#LOR WEN SIN#" userId="f0d13d38-c6da-4a13-bbd5-986d82422d78" providerId="ADAL" clId="{3D8A7C46-7ADD-4EC1-9C73-A67BF3B1AE74}" dt="2022-12-01T19:12:34.962" v="536" actId="207"/>
+          <ac:spMkLst>
+            <pc:docMk/>
+            <pc:sldMk cId="190251951" sldId="282"/>
+            <ac:spMk id="32" creationId="{9F67E1F1-0887-AC5C-5172-916BFA42A4D0}"/>
+          </ac:spMkLst>
+        </pc:spChg>
+        <pc:spChg chg="add mod">
+          <ac:chgData name="#LOR WEN SIN#" userId="f0d13d38-c6da-4a13-bbd5-986d82422d78" providerId="ADAL" clId="{3D8A7C46-7ADD-4EC1-9C73-A67BF3B1AE74}" dt="2022-12-01T19:13:01.039" v="541" actId="207"/>
+          <ac:spMkLst>
+            <pc:docMk/>
+            <pc:sldMk cId="190251951" sldId="282"/>
+            <ac:spMk id="33" creationId="{D0E6BE9D-49A1-7858-56A5-4837C0EF5200}"/>
+          </ac:spMkLst>
+        </pc:spChg>
+        <pc:spChg chg="add mod">
+          <ac:chgData name="#LOR WEN SIN#" userId="f0d13d38-c6da-4a13-bbd5-986d82422d78" providerId="ADAL" clId="{3D8A7C46-7ADD-4EC1-9C73-A67BF3B1AE74}" dt="2022-12-01T19:12:55.287" v="540" actId="207"/>
+          <ac:spMkLst>
+            <pc:docMk/>
+            <pc:sldMk cId="190251951" sldId="282"/>
+            <ac:spMk id="34" creationId="{D2DB140E-41A2-68DF-C167-633E1BC39398}"/>
+          </ac:spMkLst>
+        </pc:spChg>
+        <pc:spChg chg="add mod">
+          <ac:chgData name="#LOR WEN SIN#" userId="f0d13d38-c6da-4a13-bbd5-986d82422d78" providerId="ADAL" clId="{3D8A7C46-7ADD-4EC1-9C73-A67BF3B1AE74}" dt="2022-12-01T19:12:50.779" v="539" actId="207"/>
+          <ac:spMkLst>
+            <pc:docMk/>
+            <pc:sldMk cId="190251951" sldId="282"/>
+            <ac:spMk id="35" creationId="{7DCE24C6-81C1-9716-4522-1B68AFD79061}"/>
+          </ac:spMkLst>
+        </pc:spChg>
+        <pc:spChg chg="add mod">
+          <ac:chgData name="#LOR WEN SIN#" userId="f0d13d38-c6da-4a13-bbd5-986d82422d78" providerId="ADAL" clId="{3D8A7C46-7ADD-4EC1-9C73-A67BF3B1AE74}" dt="2022-12-01T19:12:24.680" v="535" actId="1076"/>
+          <ac:spMkLst>
+            <pc:docMk/>
+            <pc:sldMk cId="190251951" sldId="282"/>
+            <ac:spMk id="36" creationId="{01E3DFEF-0352-F429-2267-ED285EE5218B}"/>
+          </ac:spMkLst>
+        </pc:spChg>
+        <pc:spChg chg="add mod">
+          <ac:chgData name="#LOR WEN SIN#" userId="f0d13d38-c6da-4a13-bbd5-986d82422d78" providerId="ADAL" clId="{3D8A7C46-7ADD-4EC1-9C73-A67BF3B1AE74}" dt="2022-12-01T19:12:24.680" v="535" actId="1076"/>
+          <ac:spMkLst>
+            <pc:docMk/>
+            <pc:sldMk cId="190251951" sldId="282"/>
+            <ac:spMk id="37" creationId="{0680C610-EBBB-618B-F904-0FB0599DFEB6}"/>
+          </ac:spMkLst>
+        </pc:spChg>
+        <pc:spChg chg="add mod">
+          <ac:chgData name="#LOR WEN SIN#" userId="f0d13d38-c6da-4a13-bbd5-986d82422d78" providerId="ADAL" clId="{3D8A7C46-7ADD-4EC1-9C73-A67BF3B1AE74}" dt="2022-12-01T19:12:24.680" v="535" actId="1076"/>
+          <ac:spMkLst>
+            <pc:docMk/>
+            <pc:sldMk cId="190251951" sldId="282"/>
+            <ac:spMk id="38" creationId="{82CABA58-69C5-135E-EFBF-1227A71154DC}"/>
+          </ac:spMkLst>
+        </pc:spChg>
+        <pc:spChg chg="add mod">
+          <ac:chgData name="#LOR WEN SIN#" userId="f0d13d38-c6da-4a13-bbd5-986d82422d78" providerId="ADAL" clId="{3D8A7C46-7ADD-4EC1-9C73-A67BF3B1AE74}" dt="2022-12-01T19:16:24.032" v="794" actId="14100"/>
+          <ac:spMkLst>
+            <pc:docMk/>
+            <pc:sldMk cId="190251951" sldId="282"/>
+            <ac:spMk id="41" creationId="{83F8600E-B434-F5C9-7DCE-04CF095BC85A}"/>
+          </ac:spMkLst>
+        </pc:spChg>
+        <pc:spChg chg="add mod">
+          <ac:chgData name="#LOR WEN SIN#" userId="f0d13d38-c6da-4a13-bbd5-986d82422d78" providerId="ADAL" clId="{3D8A7C46-7ADD-4EC1-9C73-A67BF3B1AE74}" dt="2022-12-01T19:16:48.460" v="806" actId="14100"/>
+          <ac:spMkLst>
+            <pc:docMk/>
+            <pc:sldMk cId="190251951" sldId="282"/>
+            <ac:spMk id="42" creationId="{A63209E4-06CC-6630-615F-F3274C8D6373}"/>
+          </ac:spMkLst>
+        </pc:spChg>
+        <pc:spChg chg="add mod">
+          <ac:chgData name="#LOR WEN SIN#" userId="f0d13d38-c6da-4a13-bbd5-986d82422d78" providerId="ADAL" clId="{3D8A7C46-7ADD-4EC1-9C73-A67BF3B1AE74}" dt="2022-12-01T19:16:11.191" v="791" actId="1076"/>
+          <ac:spMkLst>
+            <pc:docMk/>
+            <pc:sldMk cId="190251951" sldId="282"/>
+            <ac:spMk id="43" creationId="{8B1F8C9E-938D-DEE3-902A-7B32D26202EF}"/>
+          </ac:spMkLst>
+        </pc:spChg>
+        <pc:picChg chg="add del mod">
+          <ac:chgData name="#LOR WEN SIN#" userId="f0d13d38-c6da-4a13-bbd5-986d82422d78" providerId="ADAL" clId="{3D8A7C46-7ADD-4EC1-9C73-A67BF3B1AE74}" dt="2022-12-01T19:02:02.029" v="462" actId="478"/>
+          <ac:picMkLst>
+            <pc:docMk/>
+            <pc:sldMk cId="190251951" sldId="282"/>
+            <ac:picMk id="3" creationId="{E371C36C-314D-FE80-423B-F2B564FC49E9}"/>
+          </ac:picMkLst>
+        </pc:picChg>
+        <pc:picChg chg="del">
+          <ac:chgData name="#LOR WEN SIN#" userId="f0d13d38-c6da-4a13-bbd5-986d82422d78" providerId="ADAL" clId="{3D8A7C46-7ADD-4EC1-9C73-A67BF3B1AE74}" dt="2022-12-01T18:52:31.998" v="445" actId="478"/>
+          <ac:picMkLst>
+            <pc:docMk/>
+            <pc:sldMk cId="190251951" sldId="282"/>
+            <ac:picMk id="4" creationId="{062730DC-AD33-E744-A459-0214A113117B}"/>
+          </ac:picMkLst>
+        </pc:picChg>
+        <pc:picChg chg="add del mod">
+          <ac:chgData name="#LOR WEN SIN#" userId="f0d13d38-c6da-4a13-bbd5-986d82422d78" providerId="ADAL" clId="{3D8A7C46-7ADD-4EC1-9C73-A67BF3B1AE74}" dt="2022-12-01T19:02:01.575" v="461" actId="478"/>
+          <ac:picMkLst>
+            <pc:docMk/>
+            <pc:sldMk cId="190251951" sldId="282"/>
+            <ac:picMk id="5" creationId="{07330349-2849-31B4-D740-02A9ACFC0EDE}"/>
+          </ac:picMkLst>
+        </pc:picChg>
+        <pc:cxnChg chg="add mod">
+          <ac:chgData name="#LOR WEN SIN#" userId="f0d13d38-c6da-4a13-bbd5-986d82422d78" providerId="ADAL" clId="{3D8A7C46-7ADD-4EC1-9C73-A67BF3B1AE74}" dt="2022-12-01T19:02:15.222" v="464" actId="208"/>
+          <ac:cxnSpMkLst>
+            <pc:docMk/>
+            <pc:sldMk cId="190251951" sldId="282"/>
+            <ac:cxnSpMk id="7" creationId="{9AA0F4AA-070F-0ED6-B0F5-9435B5F08415}"/>
+          </ac:cxnSpMkLst>
+        </pc:cxnChg>
+        <pc:cxnChg chg="add mod">
+          <ac:chgData name="#LOR WEN SIN#" userId="f0d13d38-c6da-4a13-bbd5-986d82422d78" providerId="ADAL" clId="{3D8A7C46-7ADD-4EC1-9C73-A67BF3B1AE74}" dt="2022-12-01T19:10:02.980" v="490" actId="14100"/>
+          <ac:cxnSpMkLst>
+            <pc:docMk/>
+            <pc:sldMk cId="190251951" sldId="282"/>
+            <ac:cxnSpMk id="9" creationId="{A13AEA8A-8596-45C2-AF7F-AF817325BB01}"/>
+          </ac:cxnSpMkLst>
+        </pc:cxnChg>
+        <pc:cxnChg chg="add mod">
+          <ac:chgData name="#LOR WEN SIN#" userId="f0d13d38-c6da-4a13-bbd5-986d82422d78" providerId="ADAL" clId="{3D8A7C46-7ADD-4EC1-9C73-A67BF3B1AE74}" dt="2022-12-01T19:11:34.856" v="519" actId="208"/>
+          <ac:cxnSpMkLst>
+            <pc:docMk/>
+            <pc:sldMk cId="190251951" sldId="282"/>
+            <ac:cxnSpMk id="24" creationId="{7D7A1A2D-FEBA-BC9C-D2D5-C7EBEEC64C1C}"/>
+          </ac:cxnSpMkLst>
+        </pc:cxnChg>
+        <pc:cxnChg chg="add mod">
+          <ac:chgData name="#LOR WEN SIN#" userId="f0d13d38-c6da-4a13-bbd5-986d82422d78" providerId="ADAL" clId="{3D8A7C46-7ADD-4EC1-9C73-A67BF3B1AE74}" dt="2022-12-01T19:11:40.452" v="521" actId="1076"/>
+          <ac:cxnSpMkLst>
+            <pc:docMk/>
+            <pc:sldMk cId="190251951" sldId="282"/>
+            <ac:cxnSpMk id="25" creationId="{F9E03032-2623-721C-1D67-19CF5A52E04D}"/>
+          </ac:cxnSpMkLst>
+        </pc:cxnChg>
+        <pc:cxnChg chg="add mod">
+          <ac:chgData name="#LOR WEN SIN#" userId="f0d13d38-c6da-4a13-bbd5-986d82422d78" providerId="ADAL" clId="{3D8A7C46-7ADD-4EC1-9C73-A67BF3B1AE74}" dt="2022-12-01T19:12:24.680" v="535" actId="1076"/>
+          <ac:cxnSpMkLst>
+            <pc:docMk/>
+            <pc:sldMk cId="190251951" sldId="282"/>
+            <ac:cxnSpMk id="28" creationId="{66529211-2B92-079D-2FC2-979AB1F92CEC}"/>
+          </ac:cxnSpMkLst>
+        </pc:cxnChg>
+        <pc:cxnChg chg="add mod">
+          <ac:chgData name="#LOR WEN SIN#" userId="f0d13d38-c6da-4a13-bbd5-986d82422d78" providerId="ADAL" clId="{3D8A7C46-7ADD-4EC1-9C73-A67BF3B1AE74}" dt="2022-12-01T19:12:24.680" v="535" actId="1076"/>
+          <ac:cxnSpMkLst>
+            <pc:docMk/>
+            <pc:sldMk cId="190251951" sldId="282"/>
+            <ac:cxnSpMk id="29" creationId="{6CED82BE-FD16-3926-5BE5-25A85D0F9140}"/>
+          </ac:cxnSpMkLst>
+        </pc:cxnChg>
+        <pc:cxnChg chg="add mod">
+          <ac:chgData name="#LOR WEN SIN#" userId="f0d13d38-c6da-4a13-bbd5-986d82422d78" providerId="ADAL" clId="{3D8A7C46-7ADD-4EC1-9C73-A67BF3B1AE74}" dt="2022-12-01T19:13:09.359" v="543" actId="208"/>
+          <ac:cxnSpMkLst>
+            <pc:docMk/>
+            <pc:sldMk cId="190251951" sldId="282"/>
+            <ac:cxnSpMk id="39" creationId="{4E289B8B-7257-AB86-FAB1-DD61C7CE7859}"/>
+          </ac:cxnSpMkLst>
+        </pc:cxnChg>
+        <pc:cxnChg chg="add mod">
+          <ac:chgData name="#LOR WEN SIN#" userId="f0d13d38-c6da-4a13-bbd5-986d82422d78" providerId="ADAL" clId="{3D8A7C46-7ADD-4EC1-9C73-A67BF3B1AE74}" dt="2022-12-01T19:13:05.765" v="542" actId="208"/>
+          <ac:cxnSpMkLst>
+            <pc:docMk/>
+            <pc:sldMk cId="190251951" sldId="282"/>
+            <ac:cxnSpMk id="40" creationId="{B46613AB-1E03-3ED2-3837-E01B0A125E00}"/>
+          </ac:cxnSpMkLst>
+        </pc:cxnChg>
+      </pc:sldChg>
+      <pc:sldChg chg="add">
+        <pc:chgData name="#LOR WEN SIN#" userId="f0d13d38-c6da-4a13-bbd5-986d82422d78" providerId="ADAL" clId="{3D8A7C46-7ADD-4EC1-9C73-A67BF3B1AE74}" dt="2022-12-01T19:01:59.702" v="460" actId="2890"/>
+        <pc:sldMkLst>
+          <pc:docMk/>
+          <pc:sldMk cId="2353562641" sldId="283"/>
         </pc:sldMkLst>
       </pc:sldChg>
     </pc:docChg>
@@ -4003,7 +4003,7 @@
           <a:p>
             <a:fld id="{7332B432-ACDA-4023-A761-2BAB76577B62}" type="datetime1">
               <a:rPr lang="en-US" smtClean="0"/>
-              <a:t>1/2/2023</a:t>
+              <a:t>3/10/2023</a:t>
             </a:fld>
             <a:endParaRPr lang="en-US"/>
           </a:p>
@@ -4531,7 +4531,7 @@
           <a:p>
             <a:fld id="{EA0C0817-A112-4847-8014-A94B7D2A4EA3}" type="datetime1">
               <a:rPr lang="en-US" smtClean="0"/>
-              <a:t>1/2/2023</a:t>
+              <a:t>3/10/2023</a:t>
             </a:fld>
             <a:endParaRPr lang="en-US"/>
           </a:p>
@@ -4881,7 +4881,7 @@
           <a:p>
             <a:fld id="{F6FA2B21-3FCD-4721-B95C-427943F61125}" type="datetime1">
               <a:rPr lang="en-US" smtClean="0"/>
-              <a:t>1/2/2023</a:t>
+              <a:t>3/10/2023</a:t>
             </a:fld>
             <a:endParaRPr lang="en-US"/>
           </a:p>
@@ -20134,7 +20134,7 @@
               <a:buAutoNum type="arabicPeriod"/>
             </a:pPr>
             <a:r>
-              <a:rPr lang="en-MY"/>
+              <a:rPr lang="en-MY" dirty="0"/>
               <a:t>Keep reading the papers left</a:t>
             </a:r>
           </a:p>
@@ -20143,25 +20143,25 @@
               <a:buAutoNum type="arabicPeriod"/>
             </a:pPr>
             <a:r>
-              <a:rPr lang="en-MY"/>
+              <a:rPr lang="en-MY" dirty="0"/>
               <a:t>Start trying to extract the coordinates using </a:t>
             </a:r>
             <a:r>
-              <a:rPr lang="en-MY" err="1"/>
+              <a:rPr lang="en-MY" dirty="0" err="1"/>
               <a:t>OpenPose</a:t>
             </a:r>
-            <a:endParaRPr lang="en-MY"/>
+            <a:endParaRPr lang="en-MY" dirty="0"/>
           </a:p>
           <a:p>
             <a:pPr marL="342900" indent="-342900">
               <a:buAutoNum type="arabicPeriod"/>
             </a:pPr>
             <a:r>
-              <a:rPr lang="en-MY"/>
+              <a:rPr lang="en-MY" dirty="0"/>
               <a:t>Reframe the framework with limited data and</a:t>
             </a:r>
             <a:r>
-              <a:rPr lang="en-US"/>
+              <a:rPr lang="en-US" dirty="0"/>
               <a:t> review the papers</a:t>
             </a:r>
           </a:p>
@@ -20170,10 +20170,9 @@
               <a:buAutoNum type="arabicPeriod"/>
             </a:pPr>
             <a:r>
-              <a:rPr lang="en-US"/>
+              <a:rPr lang="en-US" dirty="0"/>
               <a:t>Proposal for RGBD camera</a:t>
             </a:r>
-            <a:endParaRPr lang="en-MY"/>
           </a:p>
         </p:txBody>
       </p:sp>
@@ -32634,15 +32633,6 @@
 </file>
 
 <file path=customXml/item1.xml><?xml version="1.0" encoding="utf-8"?>
-<?mso-contentType ?>
-<FormTemplates xmlns="http://schemas.microsoft.com/sharepoint/v3/contenttype/forms">
-  <Display>DocumentLibraryForm</Display>
-  <Edit>DocumentLibraryForm</Edit>
-  <New>DocumentLibraryForm</New>
-</FormTemplates>
-</file>
-
-<file path=customXml/item2.xml><?xml version="1.0" encoding="utf-8"?>
 <ct:contentTypeSchema xmlns:ct="http://schemas.microsoft.com/office/2006/metadata/contentType" xmlns:ma="http://schemas.microsoft.com/office/2006/metadata/properties/metaAttributes" ct:_="" ma:_="" ma:contentTypeName="Document" ma:contentTypeID="0x0101008CE70BE6E7837B4B9A88D8430B8F2B0F" ma:contentTypeVersion="14" ma:contentTypeDescription="Create a new document." ma:contentTypeScope="" ma:versionID="a430e2f271684847ad258d063852a91c">
   <xsd:schema xmlns:xsd="http://www.w3.org/2001/XMLSchema" xmlns:xs="http://www.w3.org/2001/XMLSchema" xmlns:p="http://schemas.microsoft.com/office/2006/metadata/properties" xmlns:ns3="5ba216d5-a24b-4c7d-b581-f7a53554ea73" xmlns:ns4="b0e73fb5-27c0-4e65-baa0-4110d27f4ff6" targetNamespace="http://schemas.microsoft.com/office/2006/metadata/properties" ma:root="true" ma:fieldsID="29bf8cfce3f320fc7361163b245700de" ns3:_="" ns4:_="">
     <xsd:import namespace="5ba216d5-a24b-4c7d-b581-f7a53554ea73"/>
@@ -32871,6 +32861,15 @@
 </ct:contentTypeSchema>
 </file>
 
+<file path=customXml/item2.xml><?xml version="1.0" encoding="utf-8"?>
+<?mso-contentType ?>
+<FormTemplates xmlns="http://schemas.microsoft.com/sharepoint/v3/contenttype/forms">
+  <Display>DocumentLibraryForm</Display>
+  <Edit>DocumentLibraryForm</Edit>
+  <New>DocumentLibraryForm</New>
+</FormTemplates>
+</file>
+
 <file path=customXml/item3.xml><?xml version="1.0" encoding="utf-8"?>
 <p:properties xmlns:p="http://schemas.microsoft.com/office/2006/metadata/properties" xmlns:xsi="http://www.w3.org/2001/XMLSchema-instance" xmlns:pc="http://schemas.microsoft.com/office/infopath/2007/PartnerControls">
   <documentManagement>
@@ -32880,14 +32879,6 @@
 </file>
 
 <file path=customXml/itemProps1.xml><?xml version="1.0" encoding="utf-8"?>
-<ds:datastoreItem xmlns:ds="http://schemas.openxmlformats.org/officeDocument/2006/customXml" ds:itemID="{1C6DAB36-EFD9-4CF1-AA80-50685C862F5B}">
-  <ds:schemaRefs>
-    <ds:schemaRef ds:uri="http://schemas.microsoft.com/sharepoint/v3/contenttype/forms"/>
-  </ds:schemaRefs>
-</ds:datastoreItem>
-</file>
-
-<file path=customXml/itemProps2.xml><?xml version="1.0" encoding="utf-8"?>
 <ds:datastoreItem xmlns:ds="http://schemas.openxmlformats.org/officeDocument/2006/customXml" ds:itemID="{7CAAFDA7-04EB-4337-BBC2-7D9EFC99CD48}">
   <ds:schemaRefs>
     <ds:schemaRef ds:uri="5ba216d5-a24b-4c7d-b581-f7a53554ea73"/>
@@ -32902,6 +32893,14 @@
     <ds:schemaRef ds:uri="http://schemas.microsoft.com/office/infopath/2007/PartnerControls"/>
     <ds:schemaRef ds:uri="http://schemas.openxmlformats.org/package/2006/metadata/core-properties"/>
     <ds:schemaRef ds:uri="http://www.w3.org/2001/XMLSchema"/>
+  </ds:schemaRefs>
+</ds:datastoreItem>
+</file>
+
+<file path=customXml/itemProps2.xml><?xml version="1.0" encoding="utf-8"?>
+<ds:datastoreItem xmlns:ds="http://schemas.openxmlformats.org/officeDocument/2006/customXml" ds:itemID="{1C6DAB36-EFD9-4CF1-AA80-50685C862F5B}">
+  <ds:schemaRefs>
+    <ds:schemaRef ds:uri="http://schemas.microsoft.com/sharepoint/v3/contenttype/forms"/>
   </ds:schemaRefs>
 </ds:datastoreItem>
 </file>

</xml_diff>